<commit_message>
slides 13wf,14m; recurrence section in random_processes, ps12, cp14m
</commit_message>
<xml_diff>
--- a/fall11/slidesF11/slides13f.pptx
+++ b/fall11/slidesF11/slides13f.pptx
@@ -4643,7 +4643,11 @@
             </a:r>
             <a:r>
               <a:rPr lang="en-US" dirty="0" smtClean="0"/>
-              <a:t> 12M.</a:t>
+              <a:t> </a:t>
+            </a:r>
+            <a:r>
+              <a:rPr lang="en-US" dirty="0" smtClean="0"/>
+              <a:t>13F.</a:t>
             </a:r>
             <a:fld id="{B9A0B45D-6AFD-413C-B761-B121FB8BE940}" type="slidenum">
               <a:rPr lang="en-US" smtClean="0"/>
@@ -4810,7 +4814,11 @@
             </a:r>
             <a:r>
               <a:rPr lang="en-US" dirty="0" smtClean="0"/>
-              <a:t> 12M.</a:t>
+              <a:t> </a:t>
+            </a:r>
+            <a:r>
+              <a:rPr lang="en-US" dirty="0" smtClean="0"/>
+              <a:t>13F.</a:t>
             </a:r>
             <a:fld id="{B9A0B45D-6AFD-413C-B761-B121FB8BE940}" type="slidenum">
               <a:rPr lang="en-US" smtClean="0"/>
@@ -4932,7 +4940,11 @@
             </a:r>
             <a:r>
               <a:rPr lang="en-US" dirty="0" smtClean="0"/>
-              <a:t> 12M.</a:t>
+              <a:t> </a:t>
+            </a:r>
+            <a:r>
+              <a:rPr lang="en-US" dirty="0" smtClean="0"/>
+              <a:t>13F.</a:t>
             </a:r>
             <a:fld id="{B9A0B45D-6AFD-413C-B761-B121FB8BE940}" type="slidenum">
               <a:rPr lang="en-US" smtClean="0"/>
@@ -5020,7 +5032,11 @@
             </a:r>
             <a:r>
               <a:rPr lang="en-US" dirty="0" smtClean="0"/>
-              <a:t> 12M.</a:t>
+              <a:t> </a:t>
+            </a:r>
+            <a:r>
+              <a:rPr lang="en-US" dirty="0" smtClean="0"/>
+              <a:t>13F.</a:t>
             </a:r>
             <a:fld id="{B9A0B45D-6AFD-413C-B761-B121FB8BE940}" type="slidenum">
               <a:rPr lang="en-US" smtClean="0"/>
@@ -5250,7 +5266,11 @@
             </a:r>
             <a:r>
               <a:rPr lang="en-US" dirty="0" smtClean="0"/>
-              <a:t> 12M.</a:t>
+              <a:t> </a:t>
+            </a:r>
+            <a:r>
+              <a:rPr lang="en-US" dirty="0" smtClean="0"/>
+              <a:t>13F.</a:t>
             </a:r>
             <a:fld id="{B9A0B45D-6AFD-413C-B761-B121FB8BE940}" type="slidenum">
               <a:rPr lang="en-US" smtClean="0"/>
@@ -5461,7 +5481,11 @@
             </a:r>
             <a:r>
               <a:rPr lang="en-US" dirty="0" smtClean="0"/>
-              <a:t> 12M.</a:t>
+              <a:t> </a:t>
+            </a:r>
+            <a:r>
+              <a:rPr lang="en-US" dirty="0" smtClean="0"/>
+              <a:t>13F.</a:t>
             </a:r>
             <a:fld id="{B9A0B45D-6AFD-413C-B761-B121FB8BE940}" type="slidenum">
               <a:rPr lang="en-US" smtClean="0"/>
@@ -5516,8 +5540,8 @@
         </p:nvSpPr>
         <p:spPr>
           <a:xfrm>
-            <a:off x="3095306" y="6605606"/>
-            <a:ext cx="2944352" cy="252394"/>
+            <a:off x="3095306" y="6546273"/>
+            <a:ext cx="3381694" cy="311727"/>
           </a:xfrm>
           <a:prstGeom prst="rect">
             <a:avLst/>
@@ -5557,7 +5581,37 @@
                 <a:uFillTx/>
                 <a:latin typeface="Comic Sans MS" pitchFamily="66" charset="0"/>
               </a:rPr>
-              <a:t>Albert R Meyer,            April 25, 2011</a:t>
+              <a:t>Albert R Meyer,            </a:t>
+            </a:r>
+            <a:r>
+              <a:rPr kumimoji="0" lang="en-US" sz="1200" b="0" i="0" u="none" strike="noStrike" kern="1200" cap="none" spc="0" normalizeH="0" baseline="0" noProof="0" dirty="0" smtClean="0">
+                <a:ln>
+                  <a:noFill/>
+                </a:ln>
+                <a:solidFill>
+                  <a:schemeClr val="tx1"/>
+                </a:solidFill>
+                <a:effectLst/>
+                <a:uLnTx/>
+                <a:uFillTx/>
+                <a:latin typeface="Comic Sans MS" pitchFamily="66" charset="0"/>
+              </a:rPr>
+              <a:t>December 2, </a:t>
+            </a:r>
+            <a:r>
+              <a:rPr kumimoji="0" lang="en-US" sz="1200" b="0" i="0" u="none" strike="noStrike" kern="1200" cap="none" spc="0" normalizeH="0" baseline="0" noProof="0" dirty="0" smtClean="0">
+                <a:ln>
+                  <a:noFill/>
+                </a:ln>
+                <a:solidFill>
+                  <a:schemeClr val="tx1"/>
+                </a:solidFill>
+                <a:effectLst/>
+                <a:uLnTx/>
+                <a:uFillTx/>
+                <a:latin typeface="Comic Sans MS" pitchFamily="66" charset="0"/>
+              </a:rPr>
+              <a:t>2011</a:t>
             </a:r>
             <a:endParaRPr kumimoji="0" lang="en-US" sz="1200" b="0" i="0" u="none" strike="noStrike" kern="1200" cap="none" spc="0" normalizeH="0" baseline="0" noProof="0" dirty="0">
               <a:ln>
@@ -6032,7 +6086,11 @@
             </a:r>
             <a:r>
               <a:rPr lang="en-US" dirty="0" smtClean="0"/>
-              <a:t> 12M.</a:t>
+              <a:t> </a:t>
+            </a:r>
+            <a:r>
+              <a:rPr lang="en-US" dirty="0" smtClean="0"/>
+              <a:t>13F.</a:t>
             </a:r>
             <a:fld id="{B7DC7BFF-89A2-4DCB-9AA1-7530640AAA05}" type="slidenum">
               <a:rPr lang="en-US" smtClean="0"/>
@@ -6244,7 +6302,24 @@
                 <a:ea typeface="+mn-ea"/>
                 <a:cs typeface="+mn-cs"/>
               </a:rPr>
-              <a:t> 12M.</a:t>
+              <a:t> </a:t>
+            </a:r>
+            <a:r>
+              <a:rPr kumimoji="0" lang="en-US" sz="1200" b="0" i="0" u="none" strike="noStrike" kern="1200" cap="none" spc="0" normalizeH="0" baseline="0" noProof="0" dirty="0" smtClean="0">
+                <a:ln>
+                  <a:noFill/>
+                </a:ln>
+                <a:solidFill>
+                  <a:schemeClr val="tx1"/>
+                </a:solidFill>
+                <a:effectLst/>
+                <a:uLnTx/>
+                <a:uFillTx/>
+                <a:latin typeface="+mn-lt"/>
+                <a:ea typeface="+mn-ea"/>
+                <a:cs typeface="+mn-cs"/>
+              </a:rPr>
+              <a:t>13F.</a:t>
             </a:r>
             <a:fld id="{B9A0B45D-6AFD-413C-B761-B121FB8BE940}" type="slidenum">
               <a:rPr kumimoji="0" lang="en-US" sz="1200" b="0" i="0" u="none" strike="noStrike" kern="1200" cap="none" spc="0" normalizeH="0" baseline="0" noProof="0" smtClean="0">
@@ -6358,7 +6433,11 @@
             </a:r>
             <a:r>
               <a:rPr lang="en-US" dirty="0" smtClean="0"/>
-              <a:t> 12M.</a:t>
+              <a:t> </a:t>
+            </a:r>
+            <a:r>
+              <a:rPr lang="en-US" dirty="0" smtClean="0"/>
+              <a:t>13F.</a:t>
             </a:r>
             <a:fld id="{03C11430-3E20-4689-8402-8D86748BEC1A}" type="slidenum">
               <a:rPr lang="en-US" smtClean="0"/>
@@ -6569,7 +6648,7 @@
           <a:graphicData uri="http://schemas.openxmlformats.org/presentationml/2006/ole">
             <mc:AlternateContent xmlns:mc="http://schemas.openxmlformats.org/markup-compatibility/2006">
               <mc:Choice xmlns:v="urn:schemas-microsoft-com:vml" Requires="v">
-                <p:oleObj spid="_x0000_s109573" name="Equation" r:id="rId4" imgW="1447800" imgH="406400" progId="Equation.DSMT4">
+                <p:oleObj spid="_x0000_s109578" name="Equation" r:id="rId4" imgW="1447800" imgH="406400" progId="Equation.DSMT4">
                   <p:embed/>
                 </p:oleObj>
               </mc:Choice>
@@ -6639,7 +6718,7 @@
           <a:graphicData uri="http://schemas.openxmlformats.org/presentationml/2006/ole">
             <mc:AlternateContent xmlns:mc="http://schemas.openxmlformats.org/markup-compatibility/2006">
               <mc:Choice xmlns:v="urn:schemas-microsoft-com:vml" Requires="v">
-                <p:oleObj spid="_x0000_s109574" name="Equation" r:id="rId6" imgW="1422360" imgH="342720" progId="Equation.DSMT4">
+                <p:oleObj spid="_x0000_s109579" name="Equation" r:id="rId6" imgW="1422360" imgH="342720" progId="Equation.DSMT4">
                   <p:embed/>
                 </p:oleObj>
               </mc:Choice>
@@ -6781,7 +6860,24 @@
                 <a:ea typeface="+mn-ea"/>
                 <a:cs typeface="+mn-cs"/>
               </a:rPr>
-              <a:t> 12M.</a:t>
+              <a:t> </a:t>
+            </a:r>
+            <a:r>
+              <a:rPr kumimoji="0" lang="en-US" sz="1200" b="0" i="0" u="none" strike="noStrike" kern="1200" cap="none" spc="0" normalizeH="0" baseline="0" noProof="0" dirty="0" smtClean="0">
+                <a:ln>
+                  <a:noFill/>
+                </a:ln>
+                <a:solidFill>
+                  <a:schemeClr val="tx1"/>
+                </a:solidFill>
+                <a:effectLst/>
+                <a:uLnTx/>
+                <a:uFillTx/>
+                <a:latin typeface="+mn-lt"/>
+                <a:ea typeface="+mn-ea"/>
+                <a:cs typeface="+mn-cs"/>
+              </a:rPr>
+              <a:t>13F.</a:t>
             </a:r>
             <a:fld id="{B9A0B45D-6AFD-413C-B761-B121FB8BE940}" type="slidenum">
               <a:rPr kumimoji="0" lang="en-US" sz="1200" b="0" i="0" u="none" strike="noStrike" kern="1200" cap="none" spc="0" normalizeH="0" baseline="0" noProof="0" smtClean="0">
@@ -7077,7 +7173,11 @@
             </a:r>
             <a:r>
               <a:rPr lang="en-US" dirty="0" smtClean="0"/>
-              <a:t> 12M.</a:t>
+              <a:t> </a:t>
+            </a:r>
+            <a:r>
+              <a:rPr lang="en-US" dirty="0" smtClean="0"/>
+              <a:t>13F.</a:t>
             </a:r>
             <a:fld id="{69C46E76-9FBA-451C-AE7E-0013B121AE0D}" type="slidenum">
               <a:rPr lang="en-US" smtClean="0"/>
@@ -7143,7 +7243,7 @@
           <a:graphicData uri="http://schemas.openxmlformats.org/presentationml/2006/ole">
             <mc:AlternateContent xmlns:mc="http://schemas.openxmlformats.org/markup-compatibility/2006">
               <mc:Choice xmlns:v="urn:schemas-microsoft-com:vml" Requires="v">
-                <p:oleObj spid="_x0000_s113669" name="Equation" r:id="rId4" imgW="1079280" imgH="660240" progId="Equation.DSMT4">
+                <p:oleObj spid="_x0000_s113672" name="Equation" r:id="rId4" imgW="1079280" imgH="660240" progId="Equation.DSMT4">
                   <p:embed/>
                 </p:oleObj>
               </mc:Choice>
@@ -7285,7 +7385,24 @@
                 <a:ea typeface="+mn-ea"/>
                 <a:cs typeface="+mn-cs"/>
               </a:rPr>
-              <a:t> 12M.</a:t>
+              <a:t> </a:t>
+            </a:r>
+            <a:r>
+              <a:rPr kumimoji="0" lang="en-US" sz="1200" b="0" i="0" u="none" strike="noStrike" kern="1200" cap="none" spc="0" normalizeH="0" baseline="0" noProof="0" dirty="0" smtClean="0">
+                <a:ln>
+                  <a:noFill/>
+                </a:ln>
+                <a:solidFill>
+                  <a:schemeClr val="tx1"/>
+                </a:solidFill>
+                <a:effectLst/>
+                <a:uLnTx/>
+                <a:uFillTx/>
+                <a:latin typeface="+mn-lt"/>
+                <a:ea typeface="+mn-ea"/>
+                <a:cs typeface="+mn-cs"/>
+              </a:rPr>
+              <a:t>13F.</a:t>
             </a:r>
             <a:fld id="{B9A0B45D-6AFD-413C-B761-B121FB8BE940}" type="slidenum">
               <a:rPr kumimoji="0" lang="en-US" sz="1200" b="0" i="0" u="none" strike="noStrike" kern="1200" cap="none" spc="0" normalizeH="0" baseline="0" noProof="0" smtClean="0">
@@ -7531,7 +7648,11 @@
             </a:r>
             <a:r>
               <a:rPr lang="en-US" dirty="0" smtClean="0"/>
-              <a:t> 12M.</a:t>
+              <a:t> </a:t>
+            </a:r>
+            <a:r>
+              <a:rPr lang="en-US" dirty="0" smtClean="0"/>
+              <a:t>13F.</a:t>
             </a:r>
             <a:fld id="{CF7919B3-9114-487F-983E-FE0A79358A75}" type="slidenum">
               <a:rPr lang="en-US" smtClean="0"/>
@@ -7665,7 +7786,24 @@
                 <a:ea typeface="+mn-ea"/>
                 <a:cs typeface="+mn-cs"/>
               </a:rPr>
-              <a:t> 12M.</a:t>
+              <a:t> </a:t>
+            </a:r>
+            <a:r>
+              <a:rPr kumimoji="0" lang="en-US" sz="1200" b="0" i="0" u="none" strike="noStrike" kern="1200" cap="none" spc="0" normalizeH="0" baseline="0" noProof="0" dirty="0" smtClean="0">
+                <a:ln>
+                  <a:noFill/>
+                </a:ln>
+                <a:solidFill>
+                  <a:schemeClr val="tx1"/>
+                </a:solidFill>
+                <a:effectLst/>
+                <a:uLnTx/>
+                <a:uFillTx/>
+                <a:latin typeface="+mn-lt"/>
+                <a:ea typeface="+mn-ea"/>
+                <a:cs typeface="+mn-cs"/>
+              </a:rPr>
+              <a:t>13F.</a:t>
             </a:r>
             <a:fld id="{B9A0B45D-6AFD-413C-B761-B121FB8BE940}" type="slidenum">
               <a:rPr kumimoji="0" lang="en-US" sz="1200" b="0" i="0" u="none" strike="noStrike" kern="1200" cap="none" spc="0" normalizeH="0" baseline="0" noProof="0" smtClean="0">
@@ -7790,7 +7928,7 @@
           <a:graphicData uri="http://schemas.openxmlformats.org/presentationml/2006/ole">
             <mc:AlternateContent xmlns:mc="http://schemas.openxmlformats.org/markup-compatibility/2006">
               <mc:Choice xmlns:v="urn:schemas-microsoft-com:vml" Requires="v">
-                <p:oleObj spid="_x0000_s244743" name="Equation" r:id="rId4" imgW="292100" imgH="469900" progId="Equation.DSMT4">
+                <p:oleObj spid="_x0000_s244746" name="Equation" r:id="rId4" imgW="292100" imgH="469900" progId="Equation.DSMT4">
                   <p:embed/>
                 </p:oleObj>
               </mc:Choice>
@@ -8471,7 +8609,11 @@
             </a:r>
             <a:r>
               <a:rPr lang="en-US" dirty="0" smtClean="0"/>
-              <a:t> 12M.</a:t>
+              <a:t> </a:t>
+            </a:r>
+            <a:r>
+              <a:rPr lang="en-US" dirty="0" smtClean="0"/>
+              <a:t>13F.</a:t>
             </a:r>
             <a:fld id="{CF7919B3-9114-487F-983E-FE0A79358A75}" type="slidenum">
               <a:rPr lang="en-US" smtClean="0"/>
@@ -8605,7 +8747,24 @@
                 <a:ea typeface="+mn-ea"/>
                 <a:cs typeface="+mn-cs"/>
               </a:rPr>
-              <a:t> 12M.</a:t>
+              <a:t> </a:t>
+            </a:r>
+            <a:r>
+              <a:rPr kumimoji="0" lang="en-US" sz="1200" b="0" i="0" u="none" strike="noStrike" kern="1200" cap="none" spc="0" normalizeH="0" baseline="0" noProof="0" dirty="0" smtClean="0">
+                <a:ln>
+                  <a:noFill/>
+                </a:ln>
+                <a:solidFill>
+                  <a:schemeClr val="tx1"/>
+                </a:solidFill>
+                <a:effectLst/>
+                <a:uLnTx/>
+                <a:uFillTx/>
+                <a:latin typeface="+mn-lt"/>
+                <a:ea typeface="+mn-ea"/>
+                <a:cs typeface="+mn-cs"/>
+              </a:rPr>
+              <a:t>13F.</a:t>
             </a:r>
             <a:fld id="{B9A0B45D-6AFD-413C-B761-B121FB8BE940}" type="slidenum">
               <a:rPr kumimoji="0" lang="en-US" sz="1200" b="0" i="0" u="none" strike="noStrike" kern="1200" cap="none" spc="0" normalizeH="0" baseline="0" noProof="0" smtClean="0">
@@ -8674,7 +8833,7 @@
           <a:graphicData uri="http://schemas.openxmlformats.org/presentationml/2006/ole">
             <mc:AlternateContent xmlns:mc="http://schemas.openxmlformats.org/markup-compatibility/2006">
               <mc:Choice xmlns:v="urn:schemas-microsoft-com:vml" Requires="v">
-                <p:oleObj spid="_x0000_s250885" name="Equation" r:id="rId4" imgW="292100" imgH="469900" progId="Equation.DSMT4">
+                <p:oleObj spid="_x0000_s250890" name="Equation" r:id="rId4" imgW="292100" imgH="469900" progId="Equation.DSMT4">
                   <p:embed/>
                 </p:oleObj>
               </mc:Choice>
@@ -8744,7 +8903,7 @@
           <a:graphicData uri="http://schemas.openxmlformats.org/presentationml/2006/ole">
             <mc:AlternateContent xmlns:mc="http://schemas.openxmlformats.org/markup-compatibility/2006">
               <mc:Choice xmlns:v="urn:schemas-microsoft-com:vml" Requires="v">
-                <p:oleObj spid="_x0000_s250886" name="Equation" r:id="rId6" imgW="1168400" imgH="381000" progId="Equation.DSMT4">
+                <p:oleObj spid="_x0000_s250891" name="Equation" r:id="rId6" imgW="1168400" imgH="381000" progId="Equation.DSMT4">
                   <p:embed/>
                 </p:oleObj>
               </mc:Choice>
@@ -9141,7 +9300,11 @@
             </a:r>
             <a:r>
               <a:rPr lang="en-US" dirty="0" smtClean="0"/>
-              <a:t> 12M.</a:t>
+              <a:t> </a:t>
+            </a:r>
+            <a:r>
+              <a:rPr lang="en-US" dirty="0" smtClean="0"/>
+              <a:t>13F.</a:t>
             </a:r>
             <a:fld id="{99668625-B7B6-4F60-B5FE-C35153036580}" type="slidenum">
               <a:rPr lang="en-US" smtClean="0"/>
@@ -9465,7 +9628,24 @@
                 <a:ea typeface="+mn-ea"/>
                 <a:cs typeface="+mn-cs"/>
               </a:rPr>
-              <a:t> 12M.</a:t>
+              <a:t> </a:t>
+            </a:r>
+            <a:r>
+              <a:rPr kumimoji="0" lang="en-US" sz="1200" b="0" i="0" u="none" strike="noStrike" kern="1200" cap="none" spc="0" normalizeH="0" baseline="0" noProof="0" dirty="0" smtClean="0">
+                <a:ln>
+                  <a:noFill/>
+                </a:ln>
+                <a:solidFill>
+                  <a:schemeClr val="tx1"/>
+                </a:solidFill>
+                <a:effectLst/>
+                <a:uLnTx/>
+                <a:uFillTx/>
+                <a:latin typeface="+mn-lt"/>
+                <a:ea typeface="+mn-ea"/>
+                <a:cs typeface="+mn-cs"/>
+              </a:rPr>
+              <a:t>13F.</a:t>
             </a:r>
             <a:fld id="{B9A0B45D-6AFD-413C-B761-B121FB8BE940}" type="slidenum">
               <a:rPr kumimoji="0" lang="en-US" sz="1200" b="0" i="0" u="none" strike="noStrike" kern="1200" cap="none" spc="0" normalizeH="0" baseline="0" noProof="0" smtClean="0">
@@ -10035,7 +10215,11 @@
             </a:r>
             <a:r>
               <a:rPr lang="en-US" dirty="0" smtClean="0"/>
-              <a:t> 12M.</a:t>
+              <a:t> </a:t>
+            </a:r>
+            <a:r>
+              <a:rPr lang="en-US" dirty="0" smtClean="0"/>
+              <a:t>13F.</a:t>
             </a:r>
             <a:fld id="{FCF15E04-3298-48B5-AD07-D0187196EF10}" type="slidenum">
               <a:rPr lang="en-US" smtClean="0"/>
@@ -10508,7 +10692,24 @@
                 <a:ea typeface="+mn-ea"/>
                 <a:cs typeface="+mn-cs"/>
               </a:rPr>
-              <a:t> 12M.</a:t>
+              <a:t> </a:t>
+            </a:r>
+            <a:r>
+              <a:rPr kumimoji="0" lang="en-US" sz="1200" b="0" i="0" u="none" strike="noStrike" kern="1200" cap="none" spc="0" normalizeH="0" baseline="0" noProof="0" dirty="0" smtClean="0">
+                <a:ln>
+                  <a:noFill/>
+                </a:ln>
+                <a:solidFill>
+                  <a:schemeClr val="tx1"/>
+                </a:solidFill>
+                <a:effectLst/>
+                <a:uLnTx/>
+                <a:uFillTx/>
+                <a:latin typeface="+mn-lt"/>
+                <a:ea typeface="+mn-ea"/>
+                <a:cs typeface="+mn-cs"/>
+              </a:rPr>
+              <a:t>13F.</a:t>
             </a:r>
             <a:fld id="{B9A0B45D-6AFD-413C-B761-B121FB8BE940}" type="slidenum">
               <a:rPr kumimoji="0" lang="en-US" sz="1200" b="0" i="0" u="none" strike="noStrike" kern="1200" cap="none" spc="0" normalizeH="0" baseline="0" noProof="0" smtClean="0">
@@ -10922,7 +11123,11 @@
             </a:r>
             <a:r>
               <a:rPr lang="en-US" dirty="0" smtClean="0"/>
-              <a:t> 12M.</a:t>
+              <a:t> </a:t>
+            </a:r>
+            <a:r>
+              <a:rPr lang="en-US" dirty="0" smtClean="0"/>
+              <a:t>13F.</a:t>
             </a:r>
             <a:fld id="{B44A5F1B-240B-4E55-8EA4-F0567455291D}" type="slidenum">
               <a:rPr lang="en-US" smtClean="0"/>
@@ -11248,7 +11453,24 @@
                 <a:ea typeface="+mn-ea"/>
                 <a:cs typeface="+mn-cs"/>
               </a:rPr>
-              <a:t> 12M.</a:t>
+              <a:t> </a:t>
+            </a:r>
+            <a:r>
+              <a:rPr kumimoji="0" lang="en-US" sz="1200" b="0" i="0" u="none" strike="noStrike" kern="1200" cap="none" spc="0" normalizeH="0" baseline="0" noProof="0" dirty="0" smtClean="0">
+                <a:ln>
+                  <a:noFill/>
+                </a:ln>
+                <a:solidFill>
+                  <a:schemeClr val="tx1"/>
+                </a:solidFill>
+                <a:effectLst/>
+                <a:uLnTx/>
+                <a:uFillTx/>
+                <a:latin typeface="+mn-lt"/>
+                <a:ea typeface="+mn-ea"/>
+                <a:cs typeface="+mn-cs"/>
+              </a:rPr>
+              <a:t>13F.</a:t>
             </a:r>
             <a:fld id="{B9A0B45D-6AFD-413C-B761-B121FB8BE940}" type="slidenum">
               <a:rPr kumimoji="0" lang="en-US" sz="1200" b="0" i="0" u="none" strike="noStrike" kern="1200" cap="none" spc="0" normalizeH="0" baseline="0" noProof="0" smtClean="0">
@@ -11966,7 +12188,7 @@
           <a:graphicData uri="http://schemas.openxmlformats.org/presentationml/2006/ole">
             <mc:AlternateContent xmlns:mc="http://schemas.openxmlformats.org/markup-compatibility/2006">
               <mc:Choice xmlns:v="urn:schemas-microsoft-com:vml" Requires="v">
-                <p:oleObj spid="_x0000_s4107" name="Equation" r:id="rId4" imgW="698500" imgH="381000" progId="Equation.DSMT4">
+                <p:oleObj spid="_x0000_s4112" name="Equation" r:id="rId4" imgW="698500" imgH="381000" progId="Equation.DSMT4">
                   <p:embed/>
                 </p:oleObj>
               </mc:Choice>
@@ -12049,7 +12271,11 @@
             </a:r>
             <a:r>
               <a:rPr lang="en-US" dirty="0" smtClean="0"/>
-              <a:t> 12M.</a:t>
+              <a:t> </a:t>
+            </a:r>
+            <a:r>
+              <a:rPr lang="en-US" dirty="0" smtClean="0"/>
+              <a:t>13F.</a:t>
             </a:r>
             <a:fld id="{CF7919B3-9114-487F-983E-FE0A79358A75}" type="slidenum">
               <a:rPr lang="en-US" smtClean="0"/>
@@ -12111,7 +12337,7 @@
           <a:graphicData uri="http://schemas.openxmlformats.org/presentationml/2006/ole">
             <mc:AlternateContent xmlns:mc="http://schemas.openxmlformats.org/markup-compatibility/2006">
               <mc:Choice xmlns:v="urn:schemas-microsoft-com:vml" Requires="v">
-                <p:oleObj spid="_x0000_s4108" name="Equation" r:id="rId6" imgW="1002960" imgH="457200" progId="Equation.DSMT4">
+                <p:oleObj spid="_x0000_s4113" name="Equation" r:id="rId6" imgW="1002960" imgH="457200" progId="Equation.DSMT4">
                   <p:embed/>
                 </p:oleObj>
               </mc:Choice>
@@ -12456,7 +12682,24 @@
                 <a:ea typeface="+mn-ea"/>
                 <a:cs typeface="+mn-cs"/>
               </a:rPr>
-              <a:t> 12M.</a:t>
+              <a:t> </a:t>
+            </a:r>
+            <a:r>
+              <a:rPr kumimoji="0" lang="en-US" sz="1200" b="0" i="0" u="none" strike="noStrike" kern="1200" cap="none" spc="0" normalizeH="0" baseline="0" noProof="0" dirty="0" smtClean="0">
+                <a:ln>
+                  <a:noFill/>
+                </a:ln>
+                <a:solidFill>
+                  <a:schemeClr val="tx1"/>
+                </a:solidFill>
+                <a:effectLst/>
+                <a:uLnTx/>
+                <a:uFillTx/>
+                <a:latin typeface="+mn-lt"/>
+                <a:ea typeface="+mn-ea"/>
+                <a:cs typeface="+mn-cs"/>
+              </a:rPr>
+              <a:t>13F.</a:t>
             </a:r>
             <a:fld id="{B9A0B45D-6AFD-413C-B761-B121FB8BE940}" type="slidenum">
               <a:rPr kumimoji="0" lang="en-US" sz="1200" b="0" i="0" u="none" strike="noStrike" kern="1200" cap="none" spc="0" normalizeH="0" baseline="0" noProof="0" smtClean="0">
@@ -12920,7 +13163,11 @@
             </a:r>
             <a:r>
               <a:rPr lang="en-US" dirty="0" smtClean="0"/>
-              <a:t> 12M.</a:t>
+              <a:t> </a:t>
+            </a:r>
+            <a:r>
+              <a:rPr lang="en-US" dirty="0" smtClean="0"/>
+              <a:t>13F.</a:t>
             </a:r>
             <a:fld id="{1C897DF4-28BD-4138-81C1-642429381A63}" type="slidenum">
               <a:rPr lang="en-US" smtClean="0"/>
@@ -13248,7 +13495,24 @@
                 <a:ea typeface="+mn-ea"/>
                 <a:cs typeface="+mn-cs"/>
               </a:rPr>
-              <a:t> 12M.</a:t>
+              <a:t> </a:t>
+            </a:r>
+            <a:r>
+              <a:rPr kumimoji="0" lang="en-US" sz="1200" b="0" i="0" u="none" strike="noStrike" kern="1200" cap="none" spc="0" normalizeH="0" baseline="0" noProof="0" dirty="0" smtClean="0">
+                <a:ln>
+                  <a:noFill/>
+                </a:ln>
+                <a:solidFill>
+                  <a:schemeClr val="tx1"/>
+                </a:solidFill>
+                <a:effectLst/>
+                <a:uLnTx/>
+                <a:uFillTx/>
+                <a:latin typeface="+mn-lt"/>
+                <a:ea typeface="+mn-ea"/>
+                <a:cs typeface="+mn-cs"/>
+              </a:rPr>
+              <a:t>13F.</a:t>
             </a:r>
             <a:fld id="{B9A0B45D-6AFD-413C-B761-B121FB8BE940}" type="slidenum">
               <a:rPr kumimoji="0" lang="en-US" sz="1200" b="0" i="0" u="none" strike="noStrike" kern="1200" cap="none" spc="0" normalizeH="0" baseline="0" noProof="0" smtClean="0">
@@ -13610,7 +13874,11 @@
             </a:r>
             <a:r>
               <a:rPr lang="en-US" dirty="0" smtClean="0"/>
-              <a:t> 12M.</a:t>
+              <a:t> </a:t>
+            </a:r>
+            <a:r>
+              <a:rPr lang="en-US" dirty="0" smtClean="0"/>
+              <a:t>13F.</a:t>
             </a:r>
             <a:fld id="{E0A3EF45-8ED1-4608-B264-D60A304B6B90}" type="slidenum">
               <a:rPr lang="en-US" smtClean="0"/>
@@ -13935,7 +14203,7 @@
           <a:graphicData uri="http://schemas.openxmlformats.org/presentationml/2006/ole">
             <mc:AlternateContent xmlns:mc="http://schemas.openxmlformats.org/markup-compatibility/2006">
               <mc:Choice xmlns:v="urn:schemas-microsoft-com:vml" Requires="v">
-                <p:oleObj spid="_x0000_s5126" name="Equation" r:id="rId4" imgW="698400" imgH="431640" progId="Equation.DSMT4">
+                <p:oleObj spid="_x0000_s5133" name="Equation" r:id="rId4" imgW="698400" imgH="431640" progId="Equation.DSMT4">
                   <p:embed/>
                 </p:oleObj>
               </mc:Choice>
@@ -14005,7 +14273,7 @@
           <a:graphicData uri="http://schemas.openxmlformats.org/presentationml/2006/ole">
             <mc:AlternateContent xmlns:mc="http://schemas.openxmlformats.org/markup-compatibility/2006">
               <mc:Choice xmlns:v="urn:schemas-microsoft-com:vml" Requires="v">
-                <p:oleObj spid="_x0000_s5127" name="Equation" r:id="rId6" imgW="114120" imgH="215640" progId="Equation.3">
+                <p:oleObj spid="_x0000_s5134" name="Equation" r:id="rId6" imgW="114120" imgH="215640" progId="Equation.3">
                   <p:embed/>
                 </p:oleObj>
               </mc:Choice>
@@ -14075,7 +14343,7 @@
           <a:graphicData uri="http://schemas.openxmlformats.org/presentationml/2006/ole">
             <mc:AlternateContent xmlns:mc="http://schemas.openxmlformats.org/markup-compatibility/2006">
               <mc:Choice xmlns:v="urn:schemas-microsoft-com:vml" Requires="v">
-                <p:oleObj spid="_x0000_s5128" name="Equation" r:id="rId8" imgW="114120" imgH="215640" progId="Equation.3">
+                <p:oleObj spid="_x0000_s5135" name="Equation" r:id="rId8" imgW="114120" imgH="215640" progId="Equation.3">
                   <p:embed/>
                 </p:oleObj>
               </mc:Choice>
@@ -14217,7 +14485,24 @@
                 <a:ea typeface="+mn-ea"/>
                 <a:cs typeface="+mn-cs"/>
               </a:rPr>
-              <a:t> 12M.</a:t>
+              <a:t> </a:t>
+            </a:r>
+            <a:r>
+              <a:rPr kumimoji="0" lang="en-US" sz="1200" b="0" i="0" u="none" strike="noStrike" kern="1200" cap="none" spc="0" normalizeH="0" baseline="0" noProof="0" dirty="0" smtClean="0">
+                <a:ln>
+                  <a:noFill/>
+                </a:ln>
+                <a:solidFill>
+                  <a:schemeClr val="tx1"/>
+                </a:solidFill>
+                <a:effectLst/>
+                <a:uLnTx/>
+                <a:uFillTx/>
+                <a:latin typeface="+mn-lt"/>
+                <a:ea typeface="+mn-ea"/>
+                <a:cs typeface="+mn-cs"/>
+              </a:rPr>
+              <a:t>13F.</a:t>
             </a:r>
             <a:fld id="{B9A0B45D-6AFD-413C-B761-B121FB8BE940}" type="slidenum">
               <a:rPr kumimoji="0" lang="en-US" sz="1200" b="0" i="0" u="none" strike="noStrike" kern="1200" cap="none" spc="0" normalizeH="0" baseline="0" noProof="0" smtClean="0">
@@ -14512,7 +14797,11 @@
             </a:r>
             <a:r>
               <a:rPr lang="en-US" dirty="0" smtClean="0"/>
-              <a:t> 12M.</a:t>
+              <a:t> </a:t>
+            </a:r>
+            <a:r>
+              <a:rPr lang="en-US" dirty="0" smtClean="0"/>
+              <a:t>13F.</a:t>
             </a:r>
             <a:fld id="{52B71504-A7D4-4915-9F12-4FB8BCF731C5}" type="slidenum">
               <a:rPr lang="en-US" smtClean="0"/>
@@ -14646,7 +14935,7 @@
           <a:graphicData uri="http://schemas.openxmlformats.org/presentationml/2006/ole">
             <mc:AlternateContent xmlns:mc="http://schemas.openxmlformats.org/markup-compatibility/2006">
               <mc:Choice xmlns:v="urn:schemas-microsoft-com:vml" Requires="v">
-                <p:oleObj spid="_x0000_s1029" name="Equation" r:id="rId4" imgW="2260440" imgH="533160" progId="Equation.DSMT4">
+                <p:oleObj spid="_x0000_s1034" name="Equation" r:id="rId4" imgW="2260440" imgH="533160" progId="Equation.DSMT4">
                   <p:embed/>
                 </p:oleObj>
               </mc:Choice>
@@ -14716,7 +15005,7 @@
           <a:graphicData uri="http://schemas.openxmlformats.org/presentationml/2006/ole">
             <mc:AlternateContent xmlns:mc="http://schemas.openxmlformats.org/markup-compatibility/2006">
               <mc:Choice xmlns:v="urn:schemas-microsoft-com:vml" Requires="v">
-                <p:oleObj spid="_x0000_s1030" name="Equation" r:id="rId6" imgW="1117440" imgH="533160" progId="Equation.DSMT4">
+                <p:oleObj spid="_x0000_s1035" name="Equation" r:id="rId6" imgW="1117440" imgH="533160" progId="Equation.DSMT4">
                   <p:embed/>
                 </p:oleObj>
               </mc:Choice>
@@ -14858,7 +15147,24 @@
                 <a:ea typeface="+mn-ea"/>
                 <a:cs typeface="+mn-cs"/>
               </a:rPr>
-              <a:t> 12M.</a:t>
+              <a:t> </a:t>
+            </a:r>
+            <a:r>
+              <a:rPr kumimoji="0" lang="en-US" sz="1200" b="0" i="0" u="none" strike="noStrike" kern="1200" cap="none" spc="0" normalizeH="0" baseline="0" noProof="0" dirty="0" smtClean="0">
+                <a:ln>
+                  <a:noFill/>
+                </a:ln>
+                <a:solidFill>
+                  <a:schemeClr val="tx1"/>
+                </a:solidFill>
+                <a:effectLst/>
+                <a:uLnTx/>
+                <a:uFillTx/>
+                <a:latin typeface="+mn-lt"/>
+                <a:ea typeface="+mn-ea"/>
+                <a:cs typeface="+mn-cs"/>
+              </a:rPr>
+              <a:t>13F.</a:t>
             </a:r>
             <a:fld id="{B9A0B45D-6AFD-413C-B761-B121FB8BE940}" type="slidenum">
               <a:rPr kumimoji="0" lang="en-US" sz="1200" b="0" i="0" u="none" strike="noStrike" kern="1200" cap="none" spc="0" normalizeH="0" baseline="0" noProof="0" smtClean="0">
@@ -15205,7 +15511,11 @@
             </a:r>
             <a:r>
               <a:rPr lang="en-US" dirty="0" smtClean="0"/>
-              <a:t> 12M.</a:t>
+              <a:t> </a:t>
+            </a:r>
+            <a:r>
+              <a:rPr lang="en-US" dirty="0" smtClean="0"/>
+              <a:t>13F.</a:t>
             </a:r>
             <a:fld id="{A7C709AE-DFC1-4AD3-8B5A-939424C9D7C6}" type="slidenum">
               <a:rPr lang="en-US" smtClean="0"/>
@@ -15525,7 +15835,24 @@
                 <a:ea typeface="+mn-ea"/>
                 <a:cs typeface="+mn-cs"/>
               </a:rPr>
-              <a:t> 12M.</a:t>
+              <a:t> </a:t>
+            </a:r>
+            <a:r>
+              <a:rPr kumimoji="0" lang="en-US" sz="1200" b="0" i="0" u="none" strike="noStrike" kern="1200" cap="none" spc="0" normalizeH="0" baseline="0" noProof="0" dirty="0" smtClean="0">
+                <a:ln>
+                  <a:noFill/>
+                </a:ln>
+                <a:solidFill>
+                  <a:schemeClr val="tx1"/>
+                </a:solidFill>
+                <a:effectLst/>
+                <a:uLnTx/>
+                <a:uFillTx/>
+                <a:latin typeface="+mn-lt"/>
+                <a:ea typeface="+mn-ea"/>
+                <a:cs typeface="+mn-cs"/>
+              </a:rPr>
+              <a:t>13F.</a:t>
             </a:r>
             <a:fld id="{B9A0B45D-6AFD-413C-B761-B121FB8BE940}" type="slidenum">
               <a:rPr kumimoji="0" lang="en-US" sz="1200" b="0" i="0" u="none" strike="noStrike" kern="1200" cap="none" spc="0" normalizeH="0" baseline="0" noProof="0" smtClean="0">
@@ -15766,7 +16093,11 @@
             </a:r>
             <a:r>
               <a:rPr lang="en-US" dirty="0" smtClean="0"/>
-              <a:t> 12M.</a:t>
+              <a:t> </a:t>
+            </a:r>
+            <a:r>
+              <a:rPr lang="en-US" dirty="0" smtClean="0"/>
+              <a:t>13F.</a:t>
             </a:r>
             <a:fld id="{59A5E57D-2001-41D4-AD76-19AF9DD79E3E}" type="slidenum">
               <a:rPr lang="en-US" smtClean="0"/>
@@ -16141,7 +16472,24 @@
                 <a:ea typeface="+mn-ea"/>
                 <a:cs typeface="+mn-cs"/>
               </a:rPr>
-              <a:t> 12M.</a:t>
+              <a:t> </a:t>
+            </a:r>
+            <a:r>
+              <a:rPr kumimoji="0" lang="en-US" sz="1200" b="0" i="0" u="none" strike="noStrike" kern="1200" cap="none" spc="0" normalizeH="0" baseline="0" noProof="0" dirty="0" smtClean="0">
+                <a:ln>
+                  <a:noFill/>
+                </a:ln>
+                <a:solidFill>
+                  <a:schemeClr val="tx1"/>
+                </a:solidFill>
+                <a:effectLst/>
+                <a:uLnTx/>
+                <a:uFillTx/>
+                <a:latin typeface="+mn-lt"/>
+                <a:ea typeface="+mn-ea"/>
+                <a:cs typeface="+mn-cs"/>
+              </a:rPr>
+              <a:t>13F.</a:t>
             </a:r>
             <a:fld id="{B9A0B45D-6AFD-413C-B761-B121FB8BE940}" type="slidenum">
               <a:rPr kumimoji="0" lang="en-US" sz="1200" b="0" i="0" u="none" strike="noStrike" kern="1200" cap="none" spc="0" normalizeH="0" baseline="0" noProof="0" smtClean="0">
@@ -16359,7 +16707,11 @@
             </a:r>
             <a:r>
               <a:rPr lang="en-US" dirty="0" smtClean="0"/>
-              <a:t> 12M.</a:t>
+              <a:t> </a:t>
+            </a:r>
+            <a:r>
+              <a:rPr lang="en-US" dirty="0" smtClean="0"/>
+              <a:t>13F.</a:t>
             </a:r>
             <a:fld id="{2D994F43-519D-419E-A160-538A20EAE50C}" type="slidenum">
               <a:rPr lang="en-US" smtClean="0"/>
@@ -16591,7 +16943,24 @@
                 <a:ea typeface="+mn-ea"/>
                 <a:cs typeface="+mn-cs"/>
               </a:rPr>
-              <a:t> 12M.</a:t>
+              <a:t> </a:t>
+            </a:r>
+            <a:r>
+              <a:rPr kumimoji="0" lang="en-US" sz="1200" b="0" i="0" u="none" strike="noStrike" kern="1200" cap="none" spc="0" normalizeH="0" baseline="0" noProof="0" dirty="0" smtClean="0">
+                <a:ln>
+                  <a:noFill/>
+                </a:ln>
+                <a:solidFill>
+                  <a:schemeClr val="tx1"/>
+                </a:solidFill>
+                <a:effectLst/>
+                <a:uLnTx/>
+                <a:uFillTx/>
+                <a:latin typeface="+mn-lt"/>
+                <a:ea typeface="+mn-ea"/>
+                <a:cs typeface="+mn-cs"/>
+              </a:rPr>
+              <a:t>13F.</a:t>
             </a:r>
             <a:fld id="{B9A0B45D-6AFD-413C-B761-B121FB8BE940}" type="slidenum">
               <a:rPr kumimoji="0" lang="en-US" sz="1200" b="0" i="0" u="none" strike="noStrike" kern="1200" cap="none" spc="0" normalizeH="0" baseline="0" noProof="0" smtClean="0">
@@ -16827,7 +17196,11 @@
             </a:r>
             <a:r>
               <a:rPr lang="en-US" dirty="0" smtClean="0"/>
-              <a:t> 12M.</a:t>
+              <a:t> </a:t>
+            </a:r>
+            <a:r>
+              <a:rPr lang="en-US" dirty="0" smtClean="0"/>
+              <a:t>13F.</a:t>
             </a:r>
             <a:fld id="{B091242E-EDE0-4F6A-BA69-15FFB65BD54E}" type="slidenum">
               <a:rPr lang="en-US" smtClean="0"/>
@@ -17032,7 +17405,24 @@
                 <a:ea typeface="+mn-ea"/>
                 <a:cs typeface="+mn-cs"/>
               </a:rPr>
-              <a:t> 12M.</a:t>
+              <a:t> </a:t>
+            </a:r>
+            <a:r>
+              <a:rPr kumimoji="0" lang="en-US" sz="1200" b="0" i="0" u="none" strike="noStrike" kern="1200" cap="none" spc="0" normalizeH="0" baseline="0" noProof="0" dirty="0" smtClean="0">
+                <a:ln>
+                  <a:noFill/>
+                </a:ln>
+                <a:solidFill>
+                  <a:schemeClr val="tx1"/>
+                </a:solidFill>
+                <a:effectLst/>
+                <a:uLnTx/>
+                <a:uFillTx/>
+                <a:latin typeface="+mn-lt"/>
+                <a:ea typeface="+mn-ea"/>
+                <a:cs typeface="+mn-cs"/>
+              </a:rPr>
+              <a:t>13F.</a:t>
             </a:r>
             <a:fld id="{B9A0B45D-6AFD-413C-B761-B121FB8BE940}" type="slidenum">
               <a:rPr kumimoji="0" lang="en-US" sz="1200" b="0" i="0" u="none" strike="noStrike" kern="1200" cap="none" spc="0" normalizeH="0" baseline="0" noProof="0" smtClean="0">
@@ -17147,7 +17537,11 @@
             </a:r>
             <a:r>
               <a:rPr lang="en-US" dirty="0" smtClean="0"/>
-              <a:t> 12M.</a:t>
+              <a:t> </a:t>
+            </a:r>
+            <a:r>
+              <a:rPr lang="en-US" dirty="0" smtClean="0"/>
+              <a:t>13F.</a:t>
             </a:r>
             <a:fld id="{3A5FE2AD-97E1-47DD-ADC5-9D051A455375}" type="slidenum">
               <a:rPr lang="en-US" smtClean="0"/>
@@ -17337,7 +17731,7 @@
           <a:graphicData uri="http://schemas.openxmlformats.org/presentationml/2006/ole">
             <mc:AlternateContent xmlns:mc="http://schemas.openxmlformats.org/markup-compatibility/2006">
               <mc:Choice xmlns:v="urn:schemas-microsoft-com:vml" Requires="v">
-                <p:oleObj spid="_x0000_s110596" name="Equation" r:id="rId4" imgW="114120" imgH="215640" progId="Equation.3">
+                <p:oleObj spid="_x0000_s110599" name="Equation" r:id="rId4" imgW="114120" imgH="215640" progId="Equation.3">
                   <p:embed/>
                 </p:oleObj>
               </mc:Choice>
@@ -17479,7 +17873,24 @@
                 <a:ea typeface="+mn-ea"/>
                 <a:cs typeface="+mn-cs"/>
               </a:rPr>
-              <a:t> 12M.</a:t>
+              <a:t> </a:t>
+            </a:r>
+            <a:r>
+              <a:rPr kumimoji="0" lang="en-US" sz="1200" b="0" i="0" u="none" strike="noStrike" kern="1200" cap="none" spc="0" normalizeH="0" baseline="0" noProof="0" dirty="0" smtClean="0">
+                <a:ln>
+                  <a:noFill/>
+                </a:ln>
+                <a:solidFill>
+                  <a:schemeClr val="tx1"/>
+                </a:solidFill>
+                <a:effectLst/>
+                <a:uLnTx/>
+                <a:uFillTx/>
+                <a:latin typeface="+mn-lt"/>
+                <a:ea typeface="+mn-ea"/>
+                <a:cs typeface="+mn-cs"/>
+              </a:rPr>
+              <a:t>13F.</a:t>
             </a:r>
             <a:fld id="{B9A0B45D-6AFD-413C-B761-B121FB8BE940}" type="slidenum">
               <a:rPr kumimoji="0" lang="en-US" sz="1200" b="0" i="0" u="none" strike="noStrike" kern="1200" cap="none" spc="0" normalizeH="0" baseline="0" noProof="0" smtClean="0">
@@ -17853,7 +18264,11 @@
             </a:r>
             <a:r>
               <a:rPr lang="en-US" dirty="0" smtClean="0"/>
-              <a:t> 12M.</a:t>
+              <a:t> </a:t>
+            </a:r>
+            <a:r>
+              <a:rPr lang="en-US" dirty="0" smtClean="0"/>
+              <a:t>13F.</a:t>
             </a:r>
             <a:fld id="{5F75E0E2-268E-411C-B4A3-35B053FA543D}" type="slidenum">
               <a:rPr lang="en-US" smtClean="0"/>
@@ -17910,7 +18325,7 @@
           <a:graphicData uri="http://schemas.openxmlformats.org/presentationml/2006/ole">
             <mc:AlternateContent xmlns:mc="http://schemas.openxmlformats.org/markup-compatibility/2006">
               <mc:Choice xmlns:v="urn:schemas-microsoft-com:vml" Requires="v">
-                <p:oleObj spid="_x0000_s111621" name="Equation" r:id="rId4" imgW="114120" imgH="215640" progId="Equation.3">
+                <p:oleObj spid="_x0000_s111626" name="Equation" r:id="rId4" imgW="114120" imgH="215640" progId="Equation.3">
                   <p:embed/>
                 </p:oleObj>
               </mc:Choice>
@@ -17980,7 +18395,7 @@
           <a:graphicData uri="http://schemas.openxmlformats.org/presentationml/2006/ole">
             <mc:AlternateContent xmlns:mc="http://schemas.openxmlformats.org/markup-compatibility/2006">
               <mc:Choice xmlns:v="urn:schemas-microsoft-com:vml" Requires="v">
-                <p:oleObj spid="_x0000_s111622" name="Equation" r:id="rId6" imgW="126720" imgH="215640" progId="Equation.DSMT4">
+                <p:oleObj spid="_x0000_s111627" name="Equation" r:id="rId6" imgW="126720" imgH="215640" progId="Equation.DSMT4">
                   <p:embed/>
                 </p:oleObj>
               </mc:Choice>
@@ -18156,7 +18571,24 @@
                 <a:ea typeface="+mn-ea"/>
                 <a:cs typeface="+mn-cs"/>
               </a:rPr>
-              <a:t> 12M.</a:t>
+              <a:t> </a:t>
+            </a:r>
+            <a:r>
+              <a:rPr kumimoji="0" lang="en-US" sz="1200" b="0" i="0" u="none" strike="noStrike" kern="1200" cap="none" spc="0" normalizeH="0" baseline="0" noProof="0" dirty="0" smtClean="0">
+                <a:ln>
+                  <a:noFill/>
+                </a:ln>
+                <a:solidFill>
+                  <a:schemeClr val="tx1"/>
+                </a:solidFill>
+                <a:effectLst/>
+                <a:uLnTx/>
+                <a:uFillTx/>
+                <a:latin typeface="+mn-lt"/>
+                <a:ea typeface="+mn-ea"/>
+                <a:cs typeface="+mn-cs"/>
+              </a:rPr>
+              <a:t>13F.</a:t>
             </a:r>
             <a:fld id="{B9A0B45D-6AFD-413C-B761-B121FB8BE940}" type="slidenum">
               <a:rPr kumimoji="0" lang="en-US" sz="1200" b="0" i="0" u="none" strike="noStrike" kern="1200" cap="none" spc="0" normalizeH="0" baseline="0" noProof="0" smtClean="0">
@@ -18957,7 +19389,11 @@
             </a:r>
             <a:r>
               <a:rPr lang="en-US" dirty="0" smtClean="0"/>
-              <a:t> 12M.</a:t>
+              <a:t> </a:t>
+            </a:r>
+            <a:r>
+              <a:rPr lang="en-US" dirty="0" smtClean="0"/>
+              <a:t>13F.</a:t>
             </a:r>
             <a:fld id="{5F75E0E2-268E-411C-B4A3-35B053FA543D}" type="slidenum">
               <a:rPr lang="en-US" smtClean="0"/>
@@ -19014,7 +19450,7 @@
           <a:graphicData uri="http://schemas.openxmlformats.org/presentationml/2006/ole">
             <mc:AlternateContent xmlns:mc="http://schemas.openxmlformats.org/markup-compatibility/2006">
               <mc:Choice xmlns:v="urn:schemas-microsoft-com:vml" Requires="v">
-                <p:oleObj spid="_x0000_s112646" name="Equation" r:id="rId4" imgW="114120" imgH="215640" progId="Equation.3">
+                <p:oleObj spid="_x0000_s112653" name="Equation" r:id="rId4" imgW="114120" imgH="215640" progId="Equation.3">
                   <p:embed/>
                 </p:oleObj>
               </mc:Choice>
@@ -19084,7 +19520,7 @@
           <a:graphicData uri="http://schemas.openxmlformats.org/presentationml/2006/ole">
             <mc:AlternateContent xmlns:mc="http://schemas.openxmlformats.org/markup-compatibility/2006">
               <mc:Choice xmlns:v="urn:schemas-microsoft-com:vml" Requires="v">
-                <p:oleObj spid="_x0000_s112647" name="Equation" r:id="rId6" imgW="126720" imgH="215640" progId="Equation.DSMT4">
+                <p:oleObj spid="_x0000_s112654" name="Equation" r:id="rId6" imgW="126720" imgH="215640" progId="Equation.DSMT4">
                   <p:embed/>
                 </p:oleObj>
               </mc:Choice>
@@ -19188,7 +19624,7 @@
           <a:graphicData uri="http://schemas.openxmlformats.org/presentationml/2006/ole">
             <mc:AlternateContent xmlns:mc="http://schemas.openxmlformats.org/markup-compatibility/2006">
               <mc:Choice xmlns:v="urn:schemas-microsoft-com:vml" Requires="v">
-                <p:oleObj spid="_x0000_s112648" name="Equation" r:id="rId8" imgW="126720" imgH="215640" progId="Equation.DSMT4">
+                <p:oleObj spid="_x0000_s112655" name="Equation" r:id="rId8" imgW="126720" imgH="215640" progId="Equation.DSMT4">
                   <p:embed/>
                 </p:oleObj>
               </mc:Choice>
@@ -19330,7 +19766,24 @@
                 <a:ea typeface="+mn-ea"/>
                 <a:cs typeface="+mn-cs"/>
               </a:rPr>
-              <a:t> 12M.</a:t>
+              <a:t> </a:t>
+            </a:r>
+            <a:r>
+              <a:rPr kumimoji="0" lang="en-US" sz="1200" b="0" i="0" u="none" strike="noStrike" kern="1200" cap="none" spc="0" normalizeH="0" baseline="0" noProof="0" dirty="0" smtClean="0">
+                <a:ln>
+                  <a:noFill/>
+                </a:ln>
+                <a:solidFill>
+                  <a:schemeClr val="tx1"/>
+                </a:solidFill>
+                <a:effectLst/>
+                <a:uLnTx/>
+                <a:uFillTx/>
+                <a:latin typeface="+mn-lt"/>
+                <a:ea typeface="+mn-ea"/>
+                <a:cs typeface="+mn-cs"/>
+              </a:rPr>
+              <a:t>13F.</a:t>
             </a:r>
             <a:fld id="{B9A0B45D-6AFD-413C-B761-B121FB8BE940}" type="slidenum">
               <a:rPr kumimoji="0" lang="en-US" sz="1200" b="0" i="0" u="none" strike="noStrike" kern="1200" cap="none" spc="0" normalizeH="0" baseline="0" noProof="0" smtClean="0">
@@ -19747,7 +20200,11 @@
             </a:r>
             <a:r>
               <a:rPr lang="en-US" dirty="0" smtClean="0"/>
-              <a:t> 12M.</a:t>
+              <a:t> </a:t>
+            </a:r>
+            <a:r>
+              <a:rPr lang="en-US" dirty="0" smtClean="0"/>
+              <a:t>13F.</a:t>
             </a:r>
             <a:fld id="{C35FC781-3E65-46D6-8429-1B5F28414148}" type="slidenum">
               <a:rPr lang="en-US" smtClean="0"/>
@@ -19985,7 +20442,24 @@
                 <a:ea typeface="+mn-ea"/>
                 <a:cs typeface="+mn-cs"/>
               </a:rPr>
-              <a:t> 12M.</a:t>
+              <a:t> </a:t>
+            </a:r>
+            <a:r>
+              <a:rPr kumimoji="0" lang="en-US" sz="1200" b="0" i="0" u="none" strike="noStrike" kern="1200" cap="none" spc="0" normalizeH="0" baseline="0" noProof="0" dirty="0" smtClean="0">
+                <a:ln>
+                  <a:noFill/>
+                </a:ln>
+                <a:solidFill>
+                  <a:schemeClr val="tx1"/>
+                </a:solidFill>
+                <a:effectLst/>
+                <a:uLnTx/>
+                <a:uFillTx/>
+                <a:latin typeface="+mn-lt"/>
+                <a:ea typeface="+mn-ea"/>
+                <a:cs typeface="+mn-cs"/>
+              </a:rPr>
+              <a:t>13F.</a:t>
             </a:r>
             <a:fld id="{B9A0B45D-6AFD-413C-B761-B121FB8BE940}" type="slidenum">
               <a:rPr kumimoji="0" lang="en-US" sz="1200" b="0" i="0" u="none" strike="noStrike" kern="1200" cap="none" spc="0" normalizeH="0" baseline="0" noProof="0" smtClean="0">
@@ -20218,7 +20692,11 @@
             </a:r>
             <a:r>
               <a:rPr lang="en-US" dirty="0" smtClean="0"/>
-              <a:t> 12M.</a:t>
+              <a:t> </a:t>
+            </a:r>
+            <a:r>
+              <a:rPr lang="en-US" dirty="0" smtClean="0"/>
+              <a:t>13F.</a:t>
             </a:r>
             <a:fld id="{EF49FDF3-DC55-4DA0-AF17-8F95A8D045AB}" type="slidenum">
               <a:rPr lang="en-US" smtClean="0"/>
@@ -20419,7 +20897,24 @@
                 <a:ea typeface="+mn-ea"/>
                 <a:cs typeface="+mn-cs"/>
               </a:rPr>
-              <a:t> 12M.</a:t>
+              <a:t> </a:t>
+            </a:r>
+            <a:r>
+              <a:rPr kumimoji="0" lang="en-US" sz="1200" b="0" i="0" u="none" strike="noStrike" kern="1200" cap="none" spc="0" normalizeH="0" baseline="0" noProof="0" dirty="0" smtClean="0">
+                <a:ln>
+                  <a:noFill/>
+                </a:ln>
+                <a:solidFill>
+                  <a:schemeClr val="tx1"/>
+                </a:solidFill>
+                <a:effectLst/>
+                <a:uLnTx/>
+                <a:uFillTx/>
+                <a:latin typeface="+mn-lt"/>
+                <a:ea typeface="+mn-ea"/>
+                <a:cs typeface="+mn-cs"/>
+              </a:rPr>
+              <a:t>13F.</a:t>
             </a:r>
             <a:fld id="{B9A0B45D-6AFD-413C-B761-B121FB8BE940}" type="slidenum">
               <a:rPr kumimoji="0" lang="en-US" sz="1200" b="0" i="0" u="none" strike="noStrike" kern="1200" cap="none" spc="0" normalizeH="0" baseline="0" noProof="0" smtClean="0">
@@ -20534,7 +21029,11 @@
             </a:r>
             <a:r>
               <a:rPr lang="en-US" dirty="0" smtClean="0"/>
-              <a:t> 12M.</a:t>
+              <a:t> </a:t>
+            </a:r>
+            <a:r>
+              <a:rPr lang="en-US" dirty="0" smtClean="0"/>
+              <a:t>13F.</a:t>
             </a:r>
             <a:fld id="{EF49FDF3-DC55-4DA0-AF17-8F95A8D045AB}" type="slidenum">
               <a:rPr lang="en-US" smtClean="0"/>
@@ -20754,7 +21253,24 @@
                 <a:ea typeface="+mn-ea"/>
                 <a:cs typeface="+mn-cs"/>
               </a:rPr>
-              <a:t> 12M.</a:t>
+              <a:t> </a:t>
+            </a:r>
+            <a:r>
+              <a:rPr kumimoji="0" lang="en-US" sz="1200" b="0" i="0" u="none" strike="noStrike" kern="1200" cap="none" spc="0" normalizeH="0" baseline="0" noProof="0" dirty="0" smtClean="0">
+                <a:ln>
+                  <a:noFill/>
+                </a:ln>
+                <a:solidFill>
+                  <a:schemeClr val="tx1"/>
+                </a:solidFill>
+                <a:effectLst/>
+                <a:uLnTx/>
+                <a:uFillTx/>
+                <a:latin typeface="+mn-lt"/>
+                <a:ea typeface="+mn-ea"/>
+                <a:cs typeface="+mn-cs"/>
+              </a:rPr>
+              <a:t>13F.</a:t>
             </a:r>
             <a:fld id="{B9A0B45D-6AFD-413C-B761-B121FB8BE940}" type="slidenum">
               <a:rPr kumimoji="0" lang="en-US" sz="1200" b="0" i="0" u="none" strike="noStrike" kern="1200" cap="none" spc="0" normalizeH="0" baseline="0" noProof="0" smtClean="0">
@@ -20941,7 +21457,11 @@
             </a:r>
             <a:r>
               <a:rPr lang="en-US" dirty="0" smtClean="0"/>
-              <a:t> 12M.</a:t>
+              <a:t> </a:t>
+            </a:r>
+            <a:r>
+              <a:rPr lang="en-US" dirty="0" smtClean="0"/>
+              <a:t>13F.</a:t>
             </a:r>
             <a:fld id="{3E4C6C7A-C13C-402F-A962-0DA50AE12534}" type="slidenum">
               <a:rPr lang="en-US" smtClean="0"/>
@@ -21194,7 +21714,7 @@
           <a:graphicData uri="http://schemas.openxmlformats.org/presentationml/2006/ole">
             <mc:AlternateContent xmlns:mc="http://schemas.openxmlformats.org/markup-compatibility/2006">
               <mc:Choice xmlns:v="urn:schemas-microsoft-com:vml" Requires="v">
-                <p:oleObj spid="_x0000_s2052" name="Equation" r:id="rId4" imgW="1663560" imgH="444240" progId="Equation.DSMT4">
+                <p:oleObj spid="_x0000_s2055" name="Equation" r:id="rId4" imgW="1663560" imgH="444240" progId="Equation.DSMT4">
                   <p:embed/>
                 </p:oleObj>
               </mc:Choice>
@@ -21336,7 +21856,24 @@
                 <a:ea typeface="+mn-ea"/>
                 <a:cs typeface="+mn-cs"/>
               </a:rPr>
-              <a:t> 12M.</a:t>
+              <a:t> </a:t>
+            </a:r>
+            <a:r>
+              <a:rPr kumimoji="0" lang="en-US" sz="1200" b="0" i="0" u="none" strike="noStrike" kern="1200" cap="none" spc="0" normalizeH="0" baseline="0" noProof="0" dirty="0" smtClean="0">
+                <a:ln>
+                  <a:noFill/>
+                </a:ln>
+                <a:solidFill>
+                  <a:schemeClr val="tx1"/>
+                </a:solidFill>
+                <a:effectLst/>
+                <a:uLnTx/>
+                <a:uFillTx/>
+                <a:latin typeface="+mn-lt"/>
+                <a:ea typeface="+mn-ea"/>
+                <a:cs typeface="+mn-cs"/>
+              </a:rPr>
+              <a:t>13F.</a:t>
             </a:r>
             <a:fld id="{B9A0B45D-6AFD-413C-B761-B121FB8BE940}" type="slidenum">
               <a:rPr kumimoji="0" lang="en-US" sz="1200" b="0" i="0" u="none" strike="noStrike" kern="1200" cap="none" spc="0" normalizeH="0" baseline="0" noProof="0" smtClean="0">
@@ -21660,7 +22197,11 @@
             </a:r>
             <a:r>
               <a:rPr lang="en-US" dirty="0" smtClean="0"/>
-              <a:t> 12M.</a:t>
+              <a:t> </a:t>
+            </a:r>
+            <a:r>
+              <a:rPr lang="en-US" dirty="0" smtClean="0"/>
+              <a:t>13F.</a:t>
             </a:r>
             <a:fld id="{F85DF8E6-2D4E-424C-8A64-596317D67FC0}" type="slidenum">
               <a:rPr lang="en-US" smtClean="0"/>
@@ -21847,7 +22388,24 @@
                 <a:ea typeface="+mn-ea"/>
                 <a:cs typeface="+mn-cs"/>
               </a:rPr>
-              <a:t> 12M.</a:t>
+              <a:t> </a:t>
+            </a:r>
+            <a:r>
+              <a:rPr kumimoji="0" lang="en-US" sz="1200" b="0" i="0" u="none" strike="noStrike" kern="1200" cap="none" spc="0" normalizeH="0" baseline="0" noProof="0" dirty="0" smtClean="0">
+                <a:ln>
+                  <a:noFill/>
+                </a:ln>
+                <a:solidFill>
+                  <a:schemeClr val="tx1"/>
+                </a:solidFill>
+                <a:effectLst/>
+                <a:uLnTx/>
+                <a:uFillTx/>
+                <a:latin typeface="+mn-lt"/>
+                <a:ea typeface="+mn-ea"/>
+                <a:cs typeface="+mn-cs"/>
+              </a:rPr>
+              <a:t>13F.</a:t>
             </a:r>
             <a:fld id="{B9A0B45D-6AFD-413C-B761-B121FB8BE940}" type="slidenum">
               <a:rPr kumimoji="0" lang="en-US" sz="1200" b="0" i="0" u="none" strike="noStrike" kern="1200" cap="none" spc="0" normalizeH="0" baseline="0" noProof="0" smtClean="0">
@@ -21962,7 +22520,11 @@
             </a:r>
             <a:r>
               <a:rPr lang="en-US" dirty="0" smtClean="0"/>
-              <a:t> 12M.</a:t>
+              <a:t> </a:t>
+            </a:r>
+            <a:r>
+              <a:rPr lang="en-US" dirty="0" smtClean="0"/>
+              <a:t>13F.</a:t>
             </a:r>
             <a:fld id="{56D15FD8-A799-4B10-A950-01D0435A94EB}" type="slidenum">
               <a:rPr lang="en-US" smtClean="0"/>
@@ -22223,7 +22785,24 @@
                 <a:ea typeface="+mn-ea"/>
                 <a:cs typeface="+mn-cs"/>
               </a:rPr>
-              <a:t> 12M.</a:t>
+              <a:t> </a:t>
+            </a:r>
+            <a:r>
+              <a:rPr kumimoji="0" lang="en-US" sz="1200" b="0" i="0" u="none" strike="noStrike" kern="1200" cap="none" spc="0" normalizeH="0" baseline="0" noProof="0" dirty="0" smtClean="0">
+                <a:ln>
+                  <a:noFill/>
+                </a:ln>
+                <a:solidFill>
+                  <a:schemeClr val="tx1"/>
+                </a:solidFill>
+                <a:effectLst/>
+                <a:uLnTx/>
+                <a:uFillTx/>
+                <a:latin typeface="+mn-lt"/>
+                <a:ea typeface="+mn-ea"/>
+                <a:cs typeface="+mn-cs"/>
+              </a:rPr>
+              <a:t>13F.</a:t>
             </a:r>
             <a:fld id="{B9A0B45D-6AFD-413C-B761-B121FB8BE940}" type="slidenum">
               <a:rPr kumimoji="0" lang="en-US" sz="1200" b="0" i="0" u="none" strike="noStrike" kern="1200" cap="none" spc="0" normalizeH="0" baseline="0" noProof="0" smtClean="0">
@@ -22542,7 +23121,11 @@
             </a:r>
             <a:r>
               <a:rPr lang="en-US" dirty="0" smtClean="0"/>
-              <a:t> 12M.</a:t>
+              <a:t> </a:t>
+            </a:r>
+            <a:r>
+              <a:rPr lang="en-US" dirty="0" smtClean="0"/>
+              <a:t>13F.</a:t>
             </a:r>
             <a:fld id="{326F81EE-CDCA-4EE9-BD35-0F63BF2B1A84}" type="slidenum">
               <a:rPr lang="en-US" smtClean="0"/>
@@ -22758,7 +23341,24 @@
                 <a:ea typeface="+mn-ea"/>
                 <a:cs typeface="+mn-cs"/>
               </a:rPr>
-              <a:t> 12M.</a:t>
+              <a:t> </a:t>
+            </a:r>
+            <a:r>
+              <a:rPr kumimoji="0" lang="en-US" sz="1200" b="0" i="0" u="none" strike="noStrike" kern="1200" cap="none" spc="0" normalizeH="0" baseline="0" noProof="0" dirty="0" smtClean="0">
+                <a:ln>
+                  <a:noFill/>
+                </a:ln>
+                <a:solidFill>
+                  <a:schemeClr val="tx1"/>
+                </a:solidFill>
+                <a:effectLst/>
+                <a:uLnTx/>
+                <a:uFillTx/>
+                <a:latin typeface="+mn-lt"/>
+                <a:ea typeface="+mn-ea"/>
+                <a:cs typeface="+mn-cs"/>
+              </a:rPr>
+              <a:t>13F.</a:t>
             </a:r>
             <a:fld id="{B9A0B45D-6AFD-413C-B761-B121FB8BE940}" type="slidenum">
               <a:rPr kumimoji="0" lang="en-US" sz="1200" b="0" i="0" u="none" strike="noStrike" kern="1200" cap="none" spc="0" normalizeH="0" baseline="0" noProof="0" smtClean="0">
@@ -23007,7 +23607,11 @@
             </a:r>
             <a:r>
               <a:rPr lang="en-US" dirty="0" smtClean="0"/>
-              <a:t> 12M.</a:t>
+              <a:t> </a:t>
+            </a:r>
+            <a:r>
+              <a:rPr lang="en-US" dirty="0" smtClean="0"/>
+              <a:t>13F.</a:t>
             </a:r>
             <a:fld id="{0BB89C5A-C403-4815-A3F6-EDBD9149D63F}" type="slidenum">
               <a:rPr lang="en-US" smtClean="0"/>
@@ -23217,7 +23821,24 @@
                 <a:ea typeface="+mn-ea"/>
                 <a:cs typeface="+mn-cs"/>
               </a:rPr>
-              <a:t> 12M.</a:t>
+              <a:t> </a:t>
+            </a:r>
+            <a:r>
+              <a:rPr kumimoji="0" lang="en-US" sz="1200" b="0" i="0" u="none" strike="noStrike" kern="1200" cap="none" spc="0" normalizeH="0" baseline="0" noProof="0" dirty="0" smtClean="0">
+                <a:ln>
+                  <a:noFill/>
+                </a:ln>
+                <a:solidFill>
+                  <a:schemeClr val="tx1"/>
+                </a:solidFill>
+                <a:effectLst/>
+                <a:uLnTx/>
+                <a:uFillTx/>
+                <a:latin typeface="+mn-lt"/>
+                <a:ea typeface="+mn-ea"/>
+                <a:cs typeface="+mn-cs"/>
+              </a:rPr>
+              <a:t>13F.</a:t>
             </a:r>
             <a:fld id="{B9A0B45D-6AFD-413C-B761-B121FB8BE940}" type="slidenum">
               <a:rPr kumimoji="0" lang="en-US" sz="1200" b="0" i="0" u="none" strike="noStrike" kern="1200" cap="none" spc="0" normalizeH="0" baseline="0" noProof="0" smtClean="0">
@@ -23334,7 +23955,11 @@
             </a:r>
             <a:r>
               <a:rPr lang="en-US" dirty="0" smtClean="0"/>
-              <a:t> 12M.</a:t>
+              <a:t> </a:t>
+            </a:r>
+            <a:r>
+              <a:rPr lang="en-US" dirty="0" smtClean="0"/>
+              <a:t>13F.</a:t>
             </a:r>
             <a:fld id="{677826E3-95E6-4F27-8871-3C2BB5E9DC3B}" type="slidenum">
               <a:rPr lang="en-US" smtClean="0"/>
@@ -23547,7 +24172,24 @@
                 <a:ea typeface="+mn-ea"/>
                 <a:cs typeface="+mn-cs"/>
               </a:rPr>
-              <a:t> 12M.</a:t>
+              <a:t> </a:t>
+            </a:r>
+            <a:r>
+              <a:rPr kumimoji="0" lang="en-US" sz="1200" b="0" i="0" u="none" strike="noStrike" kern="1200" cap="none" spc="0" normalizeH="0" baseline="0" noProof="0" dirty="0" smtClean="0">
+                <a:ln>
+                  <a:noFill/>
+                </a:ln>
+                <a:solidFill>
+                  <a:schemeClr val="tx1"/>
+                </a:solidFill>
+                <a:effectLst/>
+                <a:uLnTx/>
+                <a:uFillTx/>
+                <a:latin typeface="+mn-lt"/>
+                <a:ea typeface="+mn-ea"/>
+                <a:cs typeface="+mn-cs"/>
+              </a:rPr>
+              <a:t>13F.</a:t>
             </a:r>
             <a:fld id="{B9A0B45D-6AFD-413C-B761-B121FB8BE940}" type="slidenum">
               <a:rPr kumimoji="0" lang="en-US" sz="1200" b="0" i="0" u="none" strike="noStrike" kern="1200" cap="none" spc="0" normalizeH="0" baseline="0" noProof="0" smtClean="0">
@@ -23981,7 +24623,11 @@
             </a:r>
             <a:r>
               <a:rPr lang="en-US" dirty="0" smtClean="0"/>
-              <a:t> 12M.</a:t>
+              <a:t> </a:t>
+            </a:r>
+            <a:r>
+              <a:rPr lang="en-US" dirty="0" smtClean="0"/>
+              <a:t>13F.</a:t>
             </a:r>
             <a:fld id="{95BE0A17-CC8A-4359-9FA2-C5A7897B1999}" type="slidenum">
               <a:rPr lang="en-US" smtClean="0"/>
@@ -24186,7 +24832,24 @@
                 <a:ea typeface="+mn-ea"/>
                 <a:cs typeface="+mn-cs"/>
               </a:rPr>
-              <a:t> 12M.</a:t>
+              <a:t> </a:t>
+            </a:r>
+            <a:r>
+              <a:rPr kumimoji="0" lang="en-US" sz="1200" b="0" i="0" u="none" strike="noStrike" kern="1200" cap="none" spc="0" normalizeH="0" baseline="0" noProof="0" dirty="0" smtClean="0">
+                <a:ln>
+                  <a:noFill/>
+                </a:ln>
+                <a:solidFill>
+                  <a:schemeClr val="tx1"/>
+                </a:solidFill>
+                <a:effectLst/>
+                <a:uLnTx/>
+                <a:uFillTx/>
+                <a:latin typeface="+mn-lt"/>
+                <a:ea typeface="+mn-ea"/>
+                <a:cs typeface="+mn-cs"/>
+              </a:rPr>
+              <a:t>13F.</a:t>
             </a:r>
             <a:fld id="{B9A0B45D-6AFD-413C-B761-B121FB8BE940}" type="slidenum">
               <a:rPr kumimoji="0" lang="en-US" sz="1200" b="0" i="0" u="none" strike="noStrike" kern="1200" cap="none" spc="0" normalizeH="0" baseline="0" noProof="0" smtClean="0">
@@ -24428,7 +25091,11 @@
             </a:r>
             <a:r>
               <a:rPr lang="en-US" dirty="0" smtClean="0"/>
-              <a:t> 12M.</a:t>
+              <a:t> </a:t>
+            </a:r>
+            <a:r>
+              <a:rPr lang="en-US" dirty="0" smtClean="0"/>
+              <a:t>13F.</a:t>
             </a:r>
             <a:fld id="{A2D81367-6BCD-497D-A5EA-C966CF7160BB}" type="slidenum">
               <a:rPr lang="en-US" smtClean="0"/>
@@ -24627,7 +25294,24 @@
                 <a:ea typeface="+mn-ea"/>
                 <a:cs typeface="+mn-cs"/>
               </a:rPr>
-              <a:t> 12M.</a:t>
+              <a:t> </a:t>
+            </a:r>
+            <a:r>
+              <a:rPr kumimoji="0" lang="en-US" sz="1200" b="0" i="0" u="none" strike="noStrike" kern="1200" cap="none" spc="0" normalizeH="0" baseline="0" noProof="0" dirty="0" smtClean="0">
+                <a:ln>
+                  <a:noFill/>
+                </a:ln>
+                <a:solidFill>
+                  <a:schemeClr val="tx1"/>
+                </a:solidFill>
+                <a:effectLst/>
+                <a:uLnTx/>
+                <a:uFillTx/>
+                <a:latin typeface="+mn-lt"/>
+                <a:ea typeface="+mn-ea"/>
+                <a:cs typeface="+mn-cs"/>
+              </a:rPr>
+              <a:t>13F.</a:t>
             </a:r>
             <a:fld id="{B9A0B45D-6AFD-413C-B761-B121FB8BE940}" type="slidenum">
               <a:rPr kumimoji="0" lang="en-US" sz="1200" b="0" i="0" u="none" strike="noStrike" kern="1200" cap="none" spc="0" normalizeH="0" baseline="0" noProof="0" smtClean="0">
@@ -24826,7 +25510,11 @@
             </a:r>
             <a:r>
               <a:rPr lang="en-US" dirty="0" smtClean="0"/>
-              <a:t> 12M.</a:t>
+              <a:t> </a:t>
+            </a:r>
+            <a:r>
+              <a:rPr lang="en-US" dirty="0" smtClean="0"/>
+              <a:t>13F.</a:t>
             </a:r>
             <a:fld id="{70BFCCC0-ED85-44D1-8BC0-19E6FB2DE4B7}" type="slidenum">
               <a:rPr lang="en-US" smtClean="0"/>
@@ -25023,7 +25711,24 @@
                 <a:ea typeface="+mn-ea"/>
                 <a:cs typeface="+mn-cs"/>
               </a:rPr>
-              <a:t> 12M.</a:t>
+              <a:t> </a:t>
+            </a:r>
+            <a:r>
+              <a:rPr kumimoji="0" lang="en-US" sz="1200" b="0" i="0" u="none" strike="noStrike" kern="1200" cap="none" spc="0" normalizeH="0" baseline="0" noProof="0" dirty="0" smtClean="0">
+                <a:ln>
+                  <a:noFill/>
+                </a:ln>
+                <a:solidFill>
+                  <a:schemeClr val="tx1"/>
+                </a:solidFill>
+                <a:effectLst/>
+                <a:uLnTx/>
+                <a:uFillTx/>
+                <a:latin typeface="+mn-lt"/>
+                <a:ea typeface="+mn-ea"/>
+                <a:cs typeface="+mn-cs"/>
+              </a:rPr>
+              <a:t>13F.</a:t>
             </a:r>
             <a:fld id="{B9A0B45D-6AFD-413C-B761-B121FB8BE940}" type="slidenum">
               <a:rPr kumimoji="0" lang="en-US" sz="1200" b="0" i="0" u="none" strike="noStrike" kern="1200" cap="none" spc="0" normalizeH="0" baseline="0" noProof="0" smtClean="0">
@@ -25138,7 +25843,11 @@
             </a:r>
             <a:r>
               <a:rPr lang="en-US" dirty="0" smtClean="0"/>
-              <a:t> 12M.</a:t>
+              <a:t> </a:t>
+            </a:r>
+            <a:r>
+              <a:rPr lang="en-US" dirty="0" smtClean="0"/>
+              <a:t>13F.</a:t>
             </a:r>
             <a:fld id="{5A566AFE-CD65-40D2-BA2E-07E1403AEF0F}" type="slidenum">
               <a:rPr lang="en-US" smtClean="0"/>
@@ -25377,7 +26086,24 @@
                 <a:ea typeface="+mn-ea"/>
                 <a:cs typeface="+mn-cs"/>
               </a:rPr>
-              <a:t> 12M.</a:t>
+              <a:t> </a:t>
+            </a:r>
+            <a:r>
+              <a:rPr kumimoji="0" lang="en-US" sz="1200" b="0" i="0" u="none" strike="noStrike" kern="1200" cap="none" spc="0" normalizeH="0" baseline="0" noProof="0" dirty="0" smtClean="0">
+                <a:ln>
+                  <a:noFill/>
+                </a:ln>
+                <a:solidFill>
+                  <a:schemeClr val="tx1"/>
+                </a:solidFill>
+                <a:effectLst/>
+                <a:uLnTx/>
+                <a:uFillTx/>
+                <a:latin typeface="+mn-lt"/>
+                <a:ea typeface="+mn-ea"/>
+                <a:cs typeface="+mn-cs"/>
+              </a:rPr>
+              <a:t>13F.</a:t>
             </a:r>
             <a:fld id="{B9A0B45D-6AFD-413C-B761-B121FB8BE940}" type="slidenum">
               <a:rPr kumimoji="0" lang="en-US" sz="1200" b="0" i="0" u="none" strike="noStrike" kern="1200" cap="none" spc="0" normalizeH="0" baseline="0" noProof="0" smtClean="0">
@@ -25824,7 +26550,11 @@
             </a:r>
             <a:r>
               <a:rPr lang="en-US" dirty="0" smtClean="0"/>
-              <a:t> 12M.</a:t>
+              <a:t> </a:t>
+            </a:r>
+            <a:r>
+              <a:rPr lang="en-US" dirty="0" smtClean="0"/>
+              <a:t>13F.</a:t>
             </a:r>
             <a:fld id="{679D5B46-281B-48C5-ADB5-CFE0495CD191}" type="slidenum">
               <a:rPr lang="en-US" smtClean="0"/>
@@ -25853,7 +26583,7 @@
           <a:graphicData uri="http://schemas.openxmlformats.org/presentationml/2006/ole">
             <mc:AlternateContent xmlns:mc="http://schemas.openxmlformats.org/markup-compatibility/2006">
               <mc:Choice xmlns:v="urn:schemas-microsoft-com:vml" Requires="v">
-                <p:oleObj spid="_x0000_s148485" name="Equation" r:id="rId4" imgW="1727200" imgH="647700" progId="Equation.DSMT4">
+                <p:oleObj spid="_x0000_s148490" name="Equation" r:id="rId4" imgW="1727200" imgH="647700" progId="Equation.DSMT4">
                   <p:embed/>
                 </p:oleObj>
               </mc:Choice>
@@ -25971,7 +26701,7 @@
             <a:graphicData uri="http://schemas.openxmlformats.org/presentationml/2006/ole">
               <mc:AlternateContent xmlns:mc="http://schemas.openxmlformats.org/markup-compatibility/2006">
                 <mc:Choice xmlns:v="urn:schemas-microsoft-com:vml" Requires="v">
-                  <p:oleObj spid="_x0000_s148486" name="Equation" r:id="rId6" imgW="215900" imgH="368300" progId="Equation.DSMT4">
+                  <p:oleObj spid="_x0000_s148491" name="Equation" r:id="rId6" imgW="215900" imgH="368300" progId="Equation.DSMT4">
                     <p:embed/>
                   </p:oleObj>
                 </mc:Choice>
@@ -26260,7 +26990,24 @@
                 <a:ea typeface="+mn-ea"/>
                 <a:cs typeface="+mn-cs"/>
               </a:rPr>
-              <a:t> 12M.</a:t>
+              <a:t> </a:t>
+            </a:r>
+            <a:r>
+              <a:rPr kumimoji="0" lang="en-US" sz="1200" b="0" i="0" u="none" strike="noStrike" kern="1200" cap="none" spc="0" normalizeH="0" baseline="0" noProof="0" dirty="0" smtClean="0">
+                <a:ln>
+                  <a:noFill/>
+                </a:ln>
+                <a:solidFill>
+                  <a:schemeClr val="tx1"/>
+                </a:solidFill>
+                <a:effectLst/>
+                <a:uLnTx/>
+                <a:uFillTx/>
+                <a:latin typeface="+mn-lt"/>
+                <a:ea typeface="+mn-ea"/>
+                <a:cs typeface="+mn-cs"/>
+              </a:rPr>
+              <a:t>13F.</a:t>
             </a:r>
             <a:fld id="{B9A0B45D-6AFD-413C-B761-B121FB8BE940}" type="slidenum">
               <a:rPr kumimoji="0" lang="en-US" sz="1200" b="0" i="0" u="none" strike="noStrike" kern="1200" cap="none" spc="0" normalizeH="0" baseline="0" noProof="0" smtClean="0">
@@ -27394,7 +28141,7 @@
           <a:graphicData uri="http://schemas.openxmlformats.org/presentationml/2006/ole">
             <mc:AlternateContent xmlns:mc="http://schemas.openxmlformats.org/markup-compatibility/2006">
               <mc:Choice xmlns:v="urn:schemas-microsoft-com:vml" Requires="v">
-                <p:oleObj spid="_x0000_s22552" name="Equation" r:id="rId4" imgW="152280" imgH="215640" progId="Equation.DSMT4">
+                <p:oleObj spid="_x0000_s22555" name="Equation" r:id="rId4" imgW="152280" imgH="215640" progId="Equation.DSMT4">
                   <p:embed/>
                 </p:oleObj>
               </mc:Choice>
@@ -27578,7 +28325,24 @@
                 <a:ea typeface="+mn-ea"/>
                 <a:cs typeface="+mn-cs"/>
               </a:rPr>
-              <a:t> 12M.</a:t>
+              <a:t> </a:t>
+            </a:r>
+            <a:r>
+              <a:rPr kumimoji="0" lang="en-US" sz="1200" b="0" i="0" u="none" strike="noStrike" kern="1200" cap="none" spc="0" normalizeH="0" baseline="0" noProof="0" dirty="0" smtClean="0">
+                <a:ln>
+                  <a:noFill/>
+                </a:ln>
+                <a:solidFill>
+                  <a:schemeClr val="tx1"/>
+                </a:solidFill>
+                <a:effectLst/>
+                <a:uLnTx/>
+                <a:uFillTx/>
+                <a:latin typeface="+mn-lt"/>
+                <a:ea typeface="+mn-ea"/>
+                <a:cs typeface="+mn-cs"/>
+              </a:rPr>
+              <a:t>13F.</a:t>
             </a:r>
             <a:fld id="{B9A0B45D-6AFD-413C-B761-B121FB8BE940}" type="slidenum">
               <a:rPr kumimoji="0" lang="en-US" sz="1200" b="0" i="0" u="none" strike="noStrike" kern="1200" cap="none" spc="0" normalizeH="0" baseline="0" noProof="0" smtClean="0">
@@ -28171,7 +28935,11 @@
             </a:r>
             <a:r>
               <a:rPr lang="en-US" dirty="0" smtClean="0"/>
-              <a:t> 12M.</a:t>
+              <a:t> </a:t>
+            </a:r>
+            <a:r>
+              <a:rPr lang="en-US" dirty="0" smtClean="0"/>
+              <a:t>13F.</a:t>
             </a:r>
             <a:fld id="{679D5B46-281B-48C5-ADB5-CFE0495CD191}" type="slidenum">
               <a:rPr lang="en-US" smtClean="0"/>
@@ -28272,7 +29040,24 @@
                 <a:ea typeface="+mn-ea"/>
                 <a:cs typeface="+mn-cs"/>
               </a:rPr>
-              <a:t> 12M.</a:t>
+              <a:t> </a:t>
+            </a:r>
+            <a:r>
+              <a:rPr kumimoji="0" lang="en-US" sz="1200" b="0" i="0" u="none" strike="noStrike" kern="1200" cap="none" spc="0" normalizeH="0" baseline="0" noProof="0" dirty="0" smtClean="0">
+                <a:ln>
+                  <a:noFill/>
+                </a:ln>
+                <a:solidFill>
+                  <a:schemeClr val="tx1"/>
+                </a:solidFill>
+                <a:effectLst/>
+                <a:uLnTx/>
+                <a:uFillTx/>
+                <a:latin typeface="+mn-lt"/>
+                <a:ea typeface="+mn-ea"/>
+                <a:cs typeface="+mn-cs"/>
+              </a:rPr>
+              <a:t>13F.</a:t>
             </a:r>
             <a:fld id="{B9A0B45D-6AFD-413C-B761-B121FB8BE940}" type="slidenum">
               <a:rPr kumimoji="0" lang="en-US" sz="1200" b="0" i="0" u="none" strike="noStrike" kern="1200" cap="none" spc="0" normalizeH="0" baseline="0" noProof="0" smtClean="0">
@@ -28770,7 +29555,11 @@
             </a:r>
             <a:r>
               <a:rPr lang="en-US" dirty="0" smtClean="0"/>
-              <a:t> 12M.</a:t>
+              <a:t> </a:t>
+            </a:r>
+            <a:r>
+              <a:rPr lang="en-US" dirty="0" smtClean="0"/>
+              <a:t>13F.</a:t>
             </a:r>
             <a:fld id="{679D5B46-281B-48C5-ADB5-CFE0495CD191}" type="slidenum">
               <a:rPr lang="en-US" smtClean="0"/>
@@ -28871,7 +29660,24 @@
                 <a:ea typeface="+mn-ea"/>
                 <a:cs typeface="+mn-cs"/>
               </a:rPr>
-              <a:t> 12M.</a:t>
+              <a:t> </a:t>
+            </a:r>
+            <a:r>
+              <a:rPr kumimoji="0" lang="en-US" sz="1200" b="0" i="0" u="none" strike="noStrike" kern="1200" cap="none" spc="0" normalizeH="0" baseline="0" noProof="0" dirty="0" smtClean="0">
+                <a:ln>
+                  <a:noFill/>
+                </a:ln>
+                <a:solidFill>
+                  <a:schemeClr val="tx1"/>
+                </a:solidFill>
+                <a:effectLst/>
+                <a:uLnTx/>
+                <a:uFillTx/>
+                <a:latin typeface="+mn-lt"/>
+                <a:ea typeface="+mn-ea"/>
+                <a:cs typeface="+mn-cs"/>
+              </a:rPr>
+              <a:t>13F.</a:t>
             </a:r>
             <a:fld id="{B9A0B45D-6AFD-413C-B761-B121FB8BE940}" type="slidenum">
               <a:rPr kumimoji="0" lang="en-US" sz="1200" b="0" i="0" u="none" strike="noStrike" kern="1200" cap="none" spc="0" normalizeH="0" baseline="0" noProof="0" smtClean="0">
@@ -28929,6 +29735,18 @@
   <p:clrMapOvr>
     <a:masterClrMapping/>
   </p:clrMapOvr>
+  <mc:AlternateContent xmlns:mc="http://schemas.openxmlformats.org/markup-compatibility/2006">
+    <mc:Choice xmlns:p14="http://schemas.microsoft.com/office/powerpoint/2010/main" Requires="p14">
+      <p:transition spd="med" p14:dur="700">
+        <p:fade/>
+      </p:transition>
+    </mc:Choice>
+    <mc:Fallback>
+      <p:transition xmlns:p14="http://schemas.microsoft.com/office/powerpoint/2010/main" spd="med">
+        <p:fade/>
+      </p:transition>
+    </mc:Fallback>
+  </mc:AlternateContent>
   <p:timing>
     <p:tnLst>
       <p:par>
@@ -28985,7 +29803,11 @@
             </a:r>
             <a:r>
               <a:rPr lang="en-US" dirty="0" smtClean="0"/>
-              <a:t> 12M.</a:t>
+              <a:t> </a:t>
+            </a:r>
+            <a:r>
+              <a:rPr lang="en-US" dirty="0" smtClean="0"/>
+              <a:t>13F.</a:t>
             </a:r>
             <a:fld id="{81C6714B-9946-4A0A-B2AD-0FB3F4CC91B5}" type="slidenum">
               <a:rPr lang="en-US" smtClean="0"/>
@@ -29172,7 +29994,24 @@
                 <a:ea typeface="+mn-ea"/>
                 <a:cs typeface="+mn-cs"/>
               </a:rPr>
-              <a:t> 12M.</a:t>
+              <a:t> </a:t>
+            </a:r>
+            <a:r>
+              <a:rPr kumimoji="0" lang="en-US" sz="1200" b="0" i="0" u="none" strike="noStrike" kern="1200" cap="none" spc="0" normalizeH="0" baseline="0" noProof="0" dirty="0" smtClean="0">
+                <a:ln>
+                  <a:noFill/>
+                </a:ln>
+                <a:solidFill>
+                  <a:schemeClr val="tx1"/>
+                </a:solidFill>
+                <a:effectLst/>
+                <a:uLnTx/>
+                <a:uFillTx/>
+                <a:latin typeface="+mn-lt"/>
+                <a:ea typeface="+mn-ea"/>
+                <a:cs typeface="+mn-cs"/>
+              </a:rPr>
+              <a:t>13F.</a:t>
             </a:r>
             <a:fld id="{B9A0B45D-6AFD-413C-B761-B121FB8BE940}" type="slidenum">
               <a:rPr kumimoji="0" lang="en-US" sz="1200" b="0" i="0" u="none" strike="noStrike" kern="1200" cap="none" spc="0" normalizeH="0" baseline="0" noProof="0" smtClean="0">
@@ -29230,7 +30069,18 @@
   <p:clrMapOvr>
     <a:masterClrMapping/>
   </p:clrMapOvr>
-  <p:transition xmlns:p14="http://schemas.microsoft.com/office/powerpoint/2010/main"/>
+  <mc:AlternateContent xmlns:mc="http://schemas.openxmlformats.org/markup-compatibility/2006">
+    <mc:Choice xmlns:p14="http://schemas.microsoft.com/office/powerpoint/2010/main" Requires="p14">
+      <p:transition spd="med" p14:dur="700">
+        <p:fade thruBlk="1"/>
+      </p:transition>
+    </mc:Choice>
+    <mc:Fallback>
+      <p:transition xmlns:p14="http://schemas.microsoft.com/office/powerpoint/2010/main" spd="med">
+        <p:fade thruBlk="1"/>
+      </p:transition>
+    </mc:Fallback>
+  </mc:AlternateContent>
   <p:timing>
     <p:tnLst>
       <p:par>
@@ -30278,7 +31128,7 @@
           <a:graphicData uri="http://schemas.openxmlformats.org/presentationml/2006/ole">
             <mc:AlternateContent xmlns:mc="http://schemas.openxmlformats.org/markup-compatibility/2006">
               <mc:Choice xmlns:v="urn:schemas-microsoft-com:vml" Requires="v">
-                <p:oleObj spid="_x0000_s175110" name="Equation" r:id="rId4" imgW="152280" imgH="215640" progId="Equation.DSMT4">
+                <p:oleObj spid="_x0000_s175117" name="Equation" r:id="rId4" imgW="152280" imgH="215640" progId="Equation.DSMT4">
                   <p:embed/>
                 </p:oleObj>
               </mc:Choice>
@@ -30348,7 +31198,7 @@
           <a:graphicData uri="http://schemas.openxmlformats.org/presentationml/2006/ole">
             <mc:AlternateContent xmlns:mc="http://schemas.openxmlformats.org/markup-compatibility/2006">
               <mc:Choice xmlns:v="urn:schemas-microsoft-com:vml" Requires="v">
-                <p:oleObj spid="_x0000_s175111" name="Equation" r:id="rId6" imgW="152280" imgH="215640" progId="Equation.DSMT4">
+                <p:oleObj spid="_x0000_s175118" name="Equation" r:id="rId6" imgW="152280" imgH="215640" progId="Equation.DSMT4">
                   <p:embed/>
                 </p:oleObj>
               </mc:Choice>
@@ -30418,7 +31268,7 @@
           <a:graphicData uri="http://schemas.openxmlformats.org/presentationml/2006/ole">
             <mc:AlternateContent xmlns:mc="http://schemas.openxmlformats.org/markup-compatibility/2006">
               <mc:Choice xmlns:v="urn:schemas-microsoft-com:vml" Requires="v">
-                <p:oleObj spid="_x0000_s175112" name="Equation" r:id="rId7" imgW="152280" imgH="215640" progId="Equation.DSMT4">
+                <p:oleObj spid="_x0000_s175119" name="Equation" r:id="rId7" imgW="152280" imgH="215640" progId="Equation.DSMT4">
                   <p:embed/>
                 </p:oleObj>
               </mc:Choice>
@@ -30560,7 +31410,24 @@
                 <a:ea typeface="+mn-ea"/>
                 <a:cs typeface="+mn-cs"/>
               </a:rPr>
-              <a:t> 12M.</a:t>
+              <a:t> </a:t>
+            </a:r>
+            <a:r>
+              <a:rPr kumimoji="0" lang="en-US" sz="1200" b="0" i="0" u="none" strike="noStrike" kern="1200" cap="none" spc="0" normalizeH="0" baseline="0" noProof="0" dirty="0" smtClean="0">
+                <a:ln>
+                  <a:noFill/>
+                </a:ln>
+                <a:solidFill>
+                  <a:schemeClr val="tx1"/>
+                </a:solidFill>
+                <a:effectLst/>
+                <a:uLnTx/>
+                <a:uFillTx/>
+                <a:latin typeface="+mn-lt"/>
+                <a:ea typeface="+mn-ea"/>
+                <a:cs typeface="+mn-cs"/>
+              </a:rPr>
+              <a:t>13F.</a:t>
             </a:r>
             <a:fld id="{B9A0B45D-6AFD-413C-B761-B121FB8BE940}" type="slidenum">
               <a:rPr kumimoji="0" lang="en-US" sz="1200" b="0" i="0" u="none" strike="noStrike" kern="1200" cap="none" spc="0" normalizeH="0" baseline="0" noProof="0" smtClean="0">
@@ -30957,7 +31824,13 @@
               <a:rPr lang="en-US" dirty="0" smtClean="0">
                 <a:latin typeface="+mj-lt"/>
               </a:rPr>
-              <a:t> 12M.</a:t>
+              <a:t> </a:t>
+            </a:r>
+            <a:r>
+              <a:rPr lang="en-US" dirty="0" smtClean="0">
+                <a:latin typeface="+mj-lt"/>
+              </a:rPr>
+              <a:t>13F.</a:t>
             </a:r>
             <a:fld id="{FC8B8329-7D1F-46A0-BB62-0C42EB792034}" type="slidenum">
               <a:rPr lang="en-US" smtClean="0">
@@ -32597,7 +33470,24 @@
                 <a:ea typeface="+mn-ea"/>
                 <a:cs typeface="+mn-cs"/>
               </a:rPr>
-              <a:t> 12M.</a:t>
+              <a:t> </a:t>
+            </a:r>
+            <a:r>
+              <a:rPr kumimoji="0" lang="en-US" sz="1200" b="0" i="0" u="none" strike="noStrike" kern="1200" cap="none" spc="0" normalizeH="0" baseline="0" noProof="0" dirty="0" smtClean="0">
+                <a:ln>
+                  <a:noFill/>
+                </a:ln>
+                <a:solidFill>
+                  <a:schemeClr val="tx1"/>
+                </a:solidFill>
+                <a:effectLst/>
+                <a:uLnTx/>
+                <a:uFillTx/>
+                <a:latin typeface="+mn-lt"/>
+                <a:ea typeface="+mn-ea"/>
+                <a:cs typeface="+mn-cs"/>
+              </a:rPr>
+              <a:t>13F.</a:t>
             </a:r>
             <a:fld id="{B9A0B45D-6AFD-413C-B761-B121FB8BE940}" type="slidenum">
               <a:rPr kumimoji="0" lang="en-US" sz="1200" b="0" i="0" u="none" strike="noStrike" kern="1200" cap="none" spc="0" normalizeH="0" baseline="0" noProof="0" smtClean="0">
@@ -33155,7 +34045,11 @@
             </a:r>
             <a:r>
               <a:rPr lang="en-US" dirty="0" smtClean="0"/>
-              <a:t> 12M.</a:t>
+              <a:t> </a:t>
+            </a:r>
+            <a:r>
+              <a:rPr lang="en-US" dirty="0" smtClean="0"/>
+              <a:t>13F.</a:t>
             </a:r>
             <a:fld id="{6243465B-1FAC-4BC8-AF6F-DE32C2D781D1}" type="slidenum">
               <a:rPr lang="en-US" smtClean="0"/>
@@ -33251,7 +34145,7 @@
           <a:graphicData uri="http://schemas.openxmlformats.org/presentationml/2006/ole">
             <mc:AlternateContent xmlns:mc="http://schemas.openxmlformats.org/markup-compatibility/2006">
               <mc:Choice xmlns:v="urn:schemas-microsoft-com:vml" Requires="v">
-                <p:oleObj spid="_x0000_s3076" name="Equation" r:id="rId4" imgW="1117440" imgH="457200" progId="Equation.DSMT4">
+                <p:oleObj spid="_x0000_s3079" name="Equation" r:id="rId4" imgW="1117440" imgH="457200" progId="Equation.DSMT4">
                   <p:embed/>
                 </p:oleObj>
               </mc:Choice>
@@ -33393,7 +34287,24 @@
                 <a:ea typeface="+mn-ea"/>
                 <a:cs typeface="+mn-cs"/>
               </a:rPr>
-              <a:t> 12M.</a:t>
+              <a:t> </a:t>
+            </a:r>
+            <a:r>
+              <a:rPr kumimoji="0" lang="en-US" sz="1200" b="0" i="0" u="none" strike="noStrike" kern="1200" cap="none" spc="0" normalizeH="0" baseline="0" noProof="0" dirty="0" smtClean="0">
+                <a:ln>
+                  <a:noFill/>
+                </a:ln>
+                <a:solidFill>
+                  <a:schemeClr val="tx1"/>
+                </a:solidFill>
+                <a:effectLst/>
+                <a:uLnTx/>
+                <a:uFillTx/>
+                <a:latin typeface="+mn-lt"/>
+                <a:ea typeface="+mn-ea"/>
+                <a:cs typeface="+mn-cs"/>
+              </a:rPr>
+              <a:t>13F.</a:t>
             </a:r>
             <a:fld id="{B9A0B45D-6AFD-413C-B761-B121FB8BE940}" type="slidenum">
               <a:rPr kumimoji="0" lang="en-US" sz="1200" b="0" i="0" u="none" strike="noStrike" kern="1200" cap="none" spc="0" normalizeH="0" baseline="0" noProof="0" smtClean="0">
@@ -33606,7 +34517,11 @@
             </a:r>
             <a:r>
               <a:rPr lang="en-US" dirty="0" smtClean="0"/>
-              <a:t> 12M.</a:t>
+              <a:t> </a:t>
+            </a:r>
+            <a:r>
+              <a:rPr lang="en-US" dirty="0" smtClean="0"/>
+              <a:t>13F.</a:t>
             </a:r>
             <a:fld id="{EAD82470-6C7C-49DD-8212-C557C8A87E2B}" type="slidenum">
               <a:rPr lang="en-US" smtClean="0"/>
@@ -34046,7 +34961,7 @@
           <a:graphicData uri="http://schemas.openxmlformats.org/presentationml/2006/ole">
             <mc:AlternateContent xmlns:mc="http://schemas.openxmlformats.org/markup-compatibility/2006">
               <mc:Choice xmlns:v="urn:schemas-microsoft-com:vml" Requires="v">
-                <p:oleObj spid="_x0000_s312326" name="Equation" r:id="rId4" imgW="457200" imgH="304800" progId="Equation.DSMT4">
+                <p:oleObj spid="_x0000_s312333" name="Equation" r:id="rId4" imgW="457200" imgH="304800" progId="Equation.DSMT4">
                   <p:embed/>
                 </p:oleObj>
               </mc:Choice>
@@ -34116,7 +35031,7 @@
           <a:graphicData uri="http://schemas.openxmlformats.org/presentationml/2006/ole">
             <mc:AlternateContent xmlns:mc="http://schemas.openxmlformats.org/markup-compatibility/2006">
               <mc:Choice xmlns:v="urn:schemas-microsoft-com:vml" Requires="v">
-                <p:oleObj spid="_x0000_s312327" name="Equation" r:id="rId6" imgW="457200" imgH="304800" progId="Equation.DSMT4">
+                <p:oleObj spid="_x0000_s312334" name="Equation" r:id="rId6" imgW="457200" imgH="304800" progId="Equation.DSMT4">
                   <p:embed/>
                 </p:oleObj>
               </mc:Choice>
@@ -34186,7 +35101,7 @@
           <a:graphicData uri="http://schemas.openxmlformats.org/presentationml/2006/ole">
             <mc:AlternateContent xmlns:mc="http://schemas.openxmlformats.org/markup-compatibility/2006">
               <mc:Choice xmlns:v="urn:schemas-microsoft-com:vml" Requires="v">
-                <p:oleObj spid="_x0000_s312328" name="Equation" r:id="rId8" imgW="444500" imgH="304800" progId="Equation.DSMT4">
+                <p:oleObj spid="_x0000_s312335" name="Equation" r:id="rId8" imgW="444500" imgH="304800" progId="Equation.DSMT4">
                   <p:embed/>
                 </p:oleObj>
               </mc:Choice>
@@ -36657,7 +37572,24 @@
                 <a:ea typeface="+mn-ea"/>
                 <a:cs typeface="+mn-cs"/>
               </a:rPr>
-              <a:t> 12M.</a:t>
+              <a:t> </a:t>
+            </a:r>
+            <a:r>
+              <a:rPr kumimoji="0" lang="en-US" sz="1200" b="0" i="0" u="none" strike="noStrike" kern="1200" cap="none" spc="0" normalizeH="0" baseline="0" noProof="0" dirty="0" smtClean="0">
+                <a:ln>
+                  <a:noFill/>
+                </a:ln>
+                <a:solidFill>
+                  <a:schemeClr val="tx1"/>
+                </a:solidFill>
+                <a:effectLst/>
+                <a:uLnTx/>
+                <a:uFillTx/>
+                <a:latin typeface="+mn-lt"/>
+                <a:ea typeface="+mn-ea"/>
+                <a:cs typeface="+mn-cs"/>
+              </a:rPr>
+              <a:t>13F.</a:t>
             </a:r>
             <a:fld id="{B9A0B45D-6AFD-413C-B761-B121FB8BE940}" type="slidenum">
               <a:rPr kumimoji="0" lang="en-US" sz="1200" b="0" i="0" u="none" strike="noStrike" kern="1200" cap="none" spc="0" normalizeH="0" baseline="0" noProof="0" smtClean="0">
@@ -37123,7 +38055,11 @@
             </a:r>
             <a:r>
               <a:rPr lang="en-US" dirty="0" smtClean="0"/>
-              <a:t> 12M.</a:t>
+              <a:t> </a:t>
+            </a:r>
+            <a:r>
+              <a:rPr lang="en-US" dirty="0" smtClean="0"/>
+              <a:t>13F.</a:t>
             </a:r>
             <a:fld id="{DE38ECCF-0D28-4EEB-A6A7-10EC65377FF2}" type="slidenum">
               <a:rPr lang="en-US" smtClean="0"/>
@@ -37478,22 +38414,28 @@
           <p:cNvGraphicFramePr>
             <a:graphicFrameLocks noChangeAspect="1"/>
           </p:cNvGraphicFramePr>
-          <p:nvPr/>
+          <p:nvPr>
+            <p:extLst>
+              <p:ext uri="{D42A27DB-BD31-4B8C-83A1-F6EECF244321}">
+                <p14:modId xmlns:p14="http://schemas.microsoft.com/office/powerpoint/2010/main" val="1147795797"/>
+              </p:ext>
+            </p:extLst>
+          </p:nvPr>
         </p:nvGraphicFramePr>
         <p:xfrm>
-          <a:off x="271794" y="1008858"/>
-          <a:ext cx="8664642" cy="1188293"/>
+          <a:off x="320675" y="1035050"/>
+          <a:ext cx="8566150" cy="1136650"/>
         </p:xfrm>
         <a:graphic>
           <a:graphicData uri="http://schemas.openxmlformats.org/presentationml/2006/ole">
             <mc:AlternateContent xmlns:mc="http://schemas.openxmlformats.org/markup-compatibility/2006">
               <mc:Choice xmlns:v="urn:schemas-microsoft-com:vml" Requires="v">
-                <p:oleObj spid="_x0000_s314372" name="Equation" r:id="rId4" imgW="2222500" imgH="304800" progId="Equation.DSMT4">
+                <p:oleObj spid="_x0000_s314375" name="Equation" r:id="rId4" imgW="2197100" imgH="292100" progId="Equation.DSMT4">
                   <p:embed/>
                 </p:oleObj>
               </mc:Choice>
               <mc:Fallback>
-                <p:oleObj name="Equation" r:id="rId4" imgW="2222500" imgH="304800" progId="Equation.DSMT4">
+                <p:oleObj name="Equation" r:id="rId4" imgW="2197100" imgH="292100" progId="Equation.DSMT4">
                   <p:embed/>
                   <p:pic>
                     <p:nvPicPr>
@@ -37504,13 +38446,7 @@
                       <p:nvPr/>
                     </p:nvPicPr>
                     <p:blipFill>
-                      <a:blip r:embed="rId5">
-                        <a:extLst>
-                          <a:ext uri="{28A0092B-C50C-407E-A947-70E740481C1C}">
-                            <a14:useLocalDpi xmlns:a14="http://schemas.microsoft.com/office/drawing/2010/main" val="0"/>
-                          </a:ext>
-                        </a:extLst>
-                      </a:blip>
+                      <a:blip r:embed="rId5"/>
                       <a:srcRect/>
                       <a:stretch>
                         <a:fillRect/>
@@ -37518,8 +38454,8 @@
                     </p:blipFill>
                     <p:spPr bwMode="auto">
                       <a:xfrm>
-                        <a:off x="271794" y="1008858"/>
-                        <a:ext cx="8664642" cy="1188293"/>
+                        <a:off x="320675" y="1035050"/>
+                        <a:ext cx="8566150" cy="1136650"/>
                       </a:xfrm>
                       <a:prstGeom prst="rect">
                         <a:avLst/>
@@ -37630,7 +38566,24 @@
                 <a:ea typeface="+mn-ea"/>
                 <a:cs typeface="+mn-cs"/>
               </a:rPr>
-              <a:t> 12M.</a:t>
+              <a:t> </a:t>
+            </a:r>
+            <a:r>
+              <a:rPr kumimoji="0" lang="en-US" sz="1200" b="0" i="0" u="none" strike="noStrike" kern="1200" cap="none" spc="0" normalizeH="0" baseline="0" noProof="0" dirty="0" smtClean="0">
+                <a:ln>
+                  <a:noFill/>
+                </a:ln>
+                <a:solidFill>
+                  <a:schemeClr val="tx1"/>
+                </a:solidFill>
+                <a:effectLst/>
+                <a:uLnTx/>
+                <a:uFillTx/>
+                <a:latin typeface="+mn-lt"/>
+                <a:ea typeface="+mn-ea"/>
+                <a:cs typeface="+mn-cs"/>
+              </a:rPr>
+              <a:t>13F.</a:t>
             </a:r>
             <a:fld id="{B9A0B45D-6AFD-413C-B761-B121FB8BE940}" type="slidenum">
               <a:rPr kumimoji="0" lang="en-US" sz="1200" b="0" i="0" u="none" strike="noStrike" kern="1200" cap="none" spc="0" normalizeH="0" baseline="0" noProof="0" smtClean="0">

</xml_diff>